<commit_message>
new version update chapter 3
</commit_message>
<xml_diff>
--- a/slides/1.pptx
+++ b/slides/1.pptx
@@ -21180,7 +21180,7 @@
                 <a:latin typeface="Consolas" panose="020B0609020204030204" charset="0"/>
                 <a:ea typeface="宋体" panose="02010600030101010101" pitchFamily="2" charset="-122"/>
               </a:rPr>
-              <a:t>"area = %d * %d = %.2f\n"</a:t>
+              <a:t>"Area = %d * %d = %.2f\n"</a:t>
             </a:r>
             <a:r>
               <a:rPr lang="en-US" b="1">
@@ -21381,6 +21381,17 @@
                         <a:buNone/>
                       </a:pPr>
                       <a:r>
+                        <a:rPr lang="en-US" altLang="zh-CN" sz="1800" b="0">
+                          <a:solidFill>
+                            <a:schemeClr val="tx1"/>
+                          </a:solidFill>
+                          <a:latin typeface="Consolas" panose="020B0609020204030204" charset="0"/>
+                          <a:cs typeface="Consolas" panose="020B0609020204030204" charset="0"/>
+                          <a:sym typeface="+mn-ea"/>
+                        </a:rPr>
+                        <a:t>A</a:t>
+                      </a:r>
+                      <a:r>
                         <a:rPr lang="zh-CN" altLang="en-US" sz="1800" b="0">
                           <a:solidFill>
                             <a:schemeClr val="tx1"/>
@@ -21389,7 +21400,7 @@
                           <a:cs typeface="Consolas" panose="020B0609020204030204" charset="0"/>
                           <a:sym typeface="+mn-ea"/>
                         </a:rPr>
-                        <a:t>area = 10 * 5 = 50.00</a:t>
+                        <a:t>rea = 10 * 5 = 50.00</a:t>
                       </a:r>
                       <a:endParaRPr lang="zh-CN" altLang="en-US" sz="1800" b="0">
                         <a:solidFill>
@@ -21678,6 +21689,17 @@
                         <a:buNone/>
                       </a:pPr>
                       <a:r>
+                        <a:rPr lang="en-US" altLang="zh-CN" sz="1800" b="0">
+                          <a:solidFill>
+                            <a:schemeClr val="tx1"/>
+                          </a:solidFill>
+                          <a:latin typeface="Consolas" panose="020B0609020204030204" charset="0"/>
+                          <a:cs typeface="Consolas" panose="020B0609020204030204" charset="0"/>
+                          <a:sym typeface="+mn-ea"/>
+                        </a:rPr>
+                        <a:t>R</a:t>
+                      </a:r>
+                      <a:r>
                         <a:rPr lang="zh-CN" altLang="en-US" sz="1800" b="0">
                           <a:solidFill>
                             <a:schemeClr val="tx1"/>
@@ -21686,7 +21708,7 @@
                           <a:cs typeface="Consolas" panose="020B0609020204030204" charset="0"/>
                           <a:sym typeface="+mn-ea"/>
                         </a:rPr>
-                        <a:t>radius: 5</a:t>
+                        <a:t>adius: 5</a:t>
                       </a:r>
                       <a:endParaRPr lang="zh-CN" altLang="en-US" sz="1800" b="0">
                         <a:solidFill>
@@ -21702,6 +21724,17 @@
                         <a:buNone/>
                       </a:pPr>
                       <a:r>
+                        <a:rPr lang="en-US" altLang="zh-CN" sz="1800" b="0">
+                          <a:solidFill>
+                            <a:schemeClr val="tx1"/>
+                          </a:solidFill>
+                          <a:latin typeface="Consolas" panose="020B0609020204030204" charset="0"/>
+                          <a:cs typeface="Consolas" panose="020B0609020204030204" charset="0"/>
+                          <a:sym typeface="+mn-ea"/>
+                        </a:rPr>
+                        <a:t>A</a:t>
+                      </a:r>
+                      <a:r>
                         <a:rPr lang="zh-CN" altLang="en-US" sz="1800" b="0">
                           <a:solidFill>
                             <a:schemeClr val="tx1"/>
@@ -21710,7 +21743,7 @@
                           <a:cs typeface="Consolas" panose="020B0609020204030204" charset="0"/>
                           <a:sym typeface="+mn-ea"/>
                         </a:rPr>
-                        <a:t>area = 78.54</a:t>
+                        <a:t>rea = 78.54</a:t>
                       </a:r>
                       <a:endParaRPr lang="zh-CN" altLang="en-US" sz="1800" b="0">
                         <a:solidFill>
@@ -22093,7 +22126,7 @@
                 <a:latin typeface="Consolas" panose="020B0609020204030204" charset="0"/>
                 <a:ea typeface="宋体" panose="02010600030101010101" pitchFamily="2" charset="-122"/>
               </a:rPr>
-              <a:t>"radius: "</a:t>
+              <a:t>"Radius: "</a:t>
             </a:r>
             <a:r>
               <a:rPr lang="en-US" b="1">
@@ -22396,7 +22429,7 @@
                 <a:latin typeface="Consolas" panose="020B0609020204030204" charset="0"/>
                 <a:ea typeface="宋体" panose="02010600030101010101" pitchFamily="2" charset="-122"/>
               </a:rPr>
-              <a:t>"area = %.2f\n"</a:t>
+              <a:t>"Area = %.2f\n"</a:t>
             </a:r>
             <a:r>
               <a:rPr lang="en-US" b="1">
@@ -23799,7 +23832,7 @@
                 <a:latin typeface="Consolas" panose="020B0609020204030204" charset="0"/>
                 <a:ea typeface="宋体" panose="02010600030101010101" pitchFamily="2" charset="-122"/>
               </a:rPr>
-              <a:t>"reversed: %d\n"</a:t>
+              <a:t>"Reversed: %d\n"</a:t>
             </a:r>
             <a:r>
               <a:rPr lang="en-US" b="1">
@@ -26014,7 +26047,7 @@
                 <a:latin typeface="Consolas" panose="020B0609020204030204" charset="0"/>
                 <a:ea typeface="宋体" panose="02010600030101010101" pitchFamily="2" charset="-122"/>
               </a:rPr>
-              <a:t>"average = %.2f\n"</a:t>
+              <a:t>"Average = %.2f\n"</a:t>
             </a:r>
             <a:r>
               <a:rPr lang="en-US" b="1">
@@ -26146,8 +26179,8 @@
           </p:nvPr>
         </p:nvGraphicFramePr>
         <p:xfrm>
-          <a:off x="5673725" y="5250180"/>
-          <a:ext cx="844550" cy="385445"/>
+          <a:off x="5018405" y="5341620"/>
+          <a:ext cx="2155190" cy="385445"/>
         </p:xfrm>
         <a:graphic>
           <a:graphicData uri="http://schemas.openxmlformats.org/drawingml/2006/table">
@@ -26156,7 +26189,7 @@
                 <a:tableStyleId>{5C22544A-7EE6-4342-B048-85BDC9FD1C3A}</a:tableStyleId>
               </a:tblPr>
               <a:tblGrid>
-                <a:gridCol w="844550"/>
+                <a:gridCol w="2155190"/>
               </a:tblGrid>
               <a:tr h="385445">
                 <a:tc>
@@ -26166,6 +26199,17 @@
                       <a:pPr>
                         <a:buNone/>
                       </a:pPr>
+                      <a:r>
+                        <a:rPr lang="en-US" altLang="zh-CN" sz="1800" b="0">
+                          <a:solidFill>
+                            <a:schemeClr val="tx1"/>
+                          </a:solidFill>
+                          <a:latin typeface="Consolas" panose="020B0609020204030204" charset="0"/>
+                          <a:cs typeface="Consolas" panose="020B0609020204030204" charset="0"/>
+                          <a:sym typeface="+mn-ea"/>
+                        </a:rPr>
+                        <a:t>Average = </a:t>
+                      </a:r>
                       <a:r>
                         <a:rPr lang="zh-CN" altLang="en-US" sz="1800" b="0">
                           <a:solidFill>
@@ -35387,8 +35431,8 @@
 
 <file path=ppt/tags/tag306.xml><?xml version="1.0" encoding="utf-8"?>
 <p:tagLst xmlns:p="http://schemas.openxmlformats.org/presentationml/2006/main">
-  <p:tag name="TABLE_ENDDRAG_ORIGIN_RECT" val="66*30"/>
-  <p:tag name="TABLE_ENDDRAG_RECT" val="737*396*66*30"/>
+  <p:tag name="TABLE_ENDDRAG_ORIGIN_RECT" val="169*30"/>
+  <p:tag name="TABLE_ENDDRAG_RECT" val="446*413*169*30"/>
 </p:tagLst>
 </file>
 

</xml_diff>

<commit_message>
Chapter 1 Practice added
</commit_message>
<xml_diff>
--- a/slides/1.pptx
+++ b/slides/1.pptx
@@ -31,11 +31,15 @@
     <p:sldId id="291" r:id="rId24"/>
     <p:sldId id="293" r:id="rId25"/>
     <p:sldId id="294" r:id="rId26"/>
+    <p:sldId id="295" r:id="rId27"/>
+    <p:sldId id="296" r:id="rId28"/>
+    <p:sldId id="297" r:id="rId29"/>
+    <p:sldId id="298" r:id="rId30"/>
   </p:sldIdLst>
   <p:sldSz cx="12192000" cy="6858000"/>
   <p:notesSz cx="6858000" cy="9144000"/>
   <p:custDataLst>
-    <p:tags r:id="rId31"/>
+    <p:tags r:id="rId35"/>
   </p:custDataLst>
   <p:defaultTextStyle>
     <a:defPPr>
@@ -1246,7 +1250,241 @@
 </p:notes>
 </file>
 
+<file path=ppt/notesSlides/notesSlide19.xml><?xml version="1.0" encoding="utf-8"?>
+<p:notes xmlns:a="http://schemas.openxmlformats.org/drawingml/2006/main" xmlns:r="http://schemas.openxmlformats.org/officeDocument/2006/relationships" xmlns:p="http://schemas.openxmlformats.org/presentationml/2006/main">
+  <p:cSld>
+    <p:spTree>
+      <p:nvGrpSpPr>
+        <p:cNvPr id="1" name=""/>
+        <p:cNvGrpSpPr/>
+        <p:nvPr/>
+      </p:nvGrpSpPr>
+      <p:grpSpPr>
+        <a:xfrm>
+          <a:off x="0" y="0"/>
+          <a:ext cx="0" cy="0"/>
+          <a:chOff x="0" y="0"/>
+          <a:chExt cx="0" cy="0"/>
+        </a:xfrm>
+      </p:grpSpPr>
+      <p:sp>
+        <p:nvSpPr>
+          <p:cNvPr id="2" name="幻灯片图像占位符 1"/>
+          <p:cNvSpPr>
+            <a:spLocks noGrp="1" noRot="1" noChangeAspect="1"/>
+          </p:cNvSpPr>
+          <p:nvPr>
+            <p:ph type="sldImg"/>
+          </p:nvPr>
+        </p:nvSpPr>
+        <p:spPr/>
+      </p:sp>
+      <p:sp>
+        <p:nvSpPr>
+          <p:cNvPr id="3" name="备注占位符 2"/>
+          <p:cNvSpPr>
+            <a:spLocks noGrp="1"/>
+          </p:cNvSpPr>
+          <p:nvPr>
+            <p:ph type="body" idx="1"/>
+          </p:nvPr>
+        </p:nvSpPr>
+        <p:spPr/>
+        <p:txBody>
+          <a:bodyPr/>
+          <a:lstStyle/>
+          <a:p>
+            <a:endParaRPr lang="zh-CN" altLang="en-US" dirty="0"/>
+          </a:p>
+        </p:txBody>
+      </p:sp>
+      <p:sp>
+        <p:nvSpPr>
+          <p:cNvPr id="4" name="灯片编号占位符 3"/>
+          <p:cNvSpPr>
+            <a:spLocks noGrp="1"/>
+          </p:cNvSpPr>
+          <p:nvPr>
+            <p:ph type="sldNum" sz="quarter" idx="5"/>
+          </p:nvPr>
+        </p:nvSpPr>
+        <p:spPr/>
+        <p:txBody>
+          <a:bodyPr/>
+          <a:lstStyle/>
+          <a:p>
+            <a:fld id="{7421D011-EC35-498F-ADE3-3197FF1A64D5}" type="slidenum">
+              <a:rPr lang="zh-CN" altLang="en-US" smtClean="0"/>
+            </a:fld>
+            <a:endParaRPr lang="zh-CN" altLang="en-US"/>
+          </a:p>
+        </p:txBody>
+      </p:sp>
+    </p:spTree>
+  </p:cSld>
+  <p:clrMapOvr>
+    <a:masterClrMapping/>
+  </p:clrMapOvr>
+</p:notes>
+</file>
+
 <file path=ppt/notesSlides/notesSlide2.xml><?xml version="1.0" encoding="utf-8"?>
+<p:notes xmlns:a="http://schemas.openxmlformats.org/drawingml/2006/main" xmlns:r="http://schemas.openxmlformats.org/officeDocument/2006/relationships" xmlns:p="http://schemas.openxmlformats.org/presentationml/2006/main">
+  <p:cSld>
+    <p:spTree>
+      <p:nvGrpSpPr>
+        <p:cNvPr id="1" name=""/>
+        <p:cNvGrpSpPr/>
+        <p:nvPr/>
+      </p:nvGrpSpPr>
+      <p:grpSpPr>
+        <a:xfrm>
+          <a:off x="0" y="0"/>
+          <a:ext cx="0" cy="0"/>
+          <a:chOff x="0" y="0"/>
+          <a:chExt cx="0" cy="0"/>
+        </a:xfrm>
+      </p:grpSpPr>
+      <p:sp>
+        <p:nvSpPr>
+          <p:cNvPr id="2" name="幻灯片图像占位符 1"/>
+          <p:cNvSpPr>
+            <a:spLocks noGrp="1" noRot="1" noChangeAspect="1"/>
+          </p:cNvSpPr>
+          <p:nvPr>
+            <p:ph type="sldImg"/>
+          </p:nvPr>
+        </p:nvSpPr>
+        <p:spPr/>
+      </p:sp>
+      <p:sp>
+        <p:nvSpPr>
+          <p:cNvPr id="3" name="备注占位符 2"/>
+          <p:cNvSpPr>
+            <a:spLocks noGrp="1"/>
+          </p:cNvSpPr>
+          <p:nvPr>
+            <p:ph type="body" idx="1"/>
+          </p:nvPr>
+        </p:nvSpPr>
+        <p:spPr/>
+        <p:txBody>
+          <a:bodyPr/>
+          <a:lstStyle/>
+          <a:p>
+            <a:endParaRPr lang="zh-CN" altLang="en-US" dirty="0"/>
+          </a:p>
+        </p:txBody>
+      </p:sp>
+      <p:sp>
+        <p:nvSpPr>
+          <p:cNvPr id="4" name="灯片编号占位符 3"/>
+          <p:cNvSpPr>
+            <a:spLocks noGrp="1"/>
+          </p:cNvSpPr>
+          <p:nvPr>
+            <p:ph type="sldNum" sz="quarter" idx="5"/>
+          </p:nvPr>
+        </p:nvSpPr>
+        <p:spPr/>
+        <p:txBody>
+          <a:bodyPr/>
+          <a:lstStyle/>
+          <a:p>
+            <a:fld id="{7421D011-EC35-498F-ADE3-3197FF1A64D5}" type="slidenum">
+              <a:rPr lang="zh-CN" altLang="en-US" smtClean="0"/>
+            </a:fld>
+            <a:endParaRPr lang="zh-CN" altLang="en-US"/>
+          </a:p>
+        </p:txBody>
+      </p:sp>
+    </p:spTree>
+  </p:cSld>
+  <p:clrMapOvr>
+    <a:masterClrMapping/>
+  </p:clrMapOvr>
+</p:notes>
+</file>
+
+<file path=ppt/notesSlides/notesSlide20.xml><?xml version="1.0" encoding="utf-8"?>
+<p:notes xmlns:a="http://schemas.openxmlformats.org/drawingml/2006/main" xmlns:r="http://schemas.openxmlformats.org/officeDocument/2006/relationships" xmlns:p="http://schemas.openxmlformats.org/presentationml/2006/main">
+  <p:cSld>
+    <p:spTree>
+      <p:nvGrpSpPr>
+        <p:cNvPr id="1" name=""/>
+        <p:cNvGrpSpPr/>
+        <p:nvPr/>
+      </p:nvGrpSpPr>
+      <p:grpSpPr>
+        <a:xfrm>
+          <a:off x="0" y="0"/>
+          <a:ext cx="0" cy="0"/>
+          <a:chOff x="0" y="0"/>
+          <a:chExt cx="0" cy="0"/>
+        </a:xfrm>
+      </p:grpSpPr>
+      <p:sp>
+        <p:nvSpPr>
+          <p:cNvPr id="2" name="幻灯片图像占位符 1"/>
+          <p:cNvSpPr>
+            <a:spLocks noGrp="1" noRot="1" noChangeAspect="1"/>
+          </p:cNvSpPr>
+          <p:nvPr>
+            <p:ph type="sldImg"/>
+          </p:nvPr>
+        </p:nvSpPr>
+        <p:spPr/>
+      </p:sp>
+      <p:sp>
+        <p:nvSpPr>
+          <p:cNvPr id="3" name="备注占位符 2"/>
+          <p:cNvSpPr>
+            <a:spLocks noGrp="1"/>
+          </p:cNvSpPr>
+          <p:nvPr>
+            <p:ph type="body" idx="1"/>
+          </p:nvPr>
+        </p:nvSpPr>
+        <p:spPr/>
+        <p:txBody>
+          <a:bodyPr/>
+          <a:lstStyle/>
+          <a:p>
+            <a:endParaRPr lang="zh-CN" altLang="en-US" dirty="0"/>
+          </a:p>
+        </p:txBody>
+      </p:sp>
+      <p:sp>
+        <p:nvSpPr>
+          <p:cNvPr id="4" name="灯片编号占位符 3"/>
+          <p:cNvSpPr>
+            <a:spLocks noGrp="1"/>
+          </p:cNvSpPr>
+          <p:nvPr>
+            <p:ph type="sldNum" sz="quarter" idx="5"/>
+          </p:nvPr>
+        </p:nvSpPr>
+        <p:spPr/>
+        <p:txBody>
+          <a:bodyPr/>
+          <a:lstStyle/>
+          <a:p>
+            <a:fld id="{7421D011-EC35-498F-ADE3-3197FF1A64D5}" type="slidenum">
+              <a:rPr lang="zh-CN" altLang="en-US" smtClean="0"/>
+            </a:fld>
+            <a:endParaRPr lang="zh-CN" altLang="en-US"/>
+          </a:p>
+        </p:txBody>
+      </p:sp>
+    </p:spTree>
+  </p:cSld>
+  <p:clrMapOvr>
+    <a:masterClrMapping/>
+  </p:clrMapOvr>
+</p:notes>
+</file>
+
+<file path=ppt/notesSlides/notesSlide21.xml><?xml version="1.0" encoding="utf-8"?>
 <p:notes xmlns:a="http://schemas.openxmlformats.org/drawingml/2006/main" xmlns:r="http://schemas.openxmlformats.org/officeDocument/2006/relationships" xmlns:p="http://schemas.openxmlformats.org/presentationml/2006/main">
   <p:cSld>
     <p:spTree>
@@ -26248,6 +26486,2403 @@
     </p:spTree>
     <p:custDataLst>
       <p:tags r:id="rId4"/>
+    </p:custDataLst>
+  </p:cSld>
+  <p:clrMapOvr>
+    <a:masterClrMapping/>
+  </p:clrMapOvr>
+</p:sld>
+</file>
+
+<file path=ppt/slides/slide23.xml><?xml version="1.0" encoding="utf-8"?>
+<p:sld xmlns:a="http://schemas.openxmlformats.org/drawingml/2006/main" xmlns:r="http://schemas.openxmlformats.org/officeDocument/2006/relationships" xmlns:p="http://schemas.openxmlformats.org/presentationml/2006/main">
+  <p:cSld>
+    <p:spTree>
+      <p:nvGrpSpPr>
+        <p:cNvPr id="1" name=""/>
+        <p:cNvGrpSpPr/>
+        <p:nvPr/>
+      </p:nvGrpSpPr>
+      <p:grpSpPr>
+        <a:xfrm>
+          <a:off x="0" y="0"/>
+          <a:ext cx="0" cy="0"/>
+          <a:chOff x="0" y="0"/>
+          <a:chExt cx="0" cy="0"/>
+        </a:xfrm>
+      </p:grpSpPr>
+      <p:sp>
+        <p:nvSpPr>
+          <p:cNvPr id="10" name="标题 9"/>
+          <p:cNvSpPr>
+            <a:spLocks noGrp="1"/>
+          </p:cNvSpPr>
+          <p:nvPr>
+            <p:ph type="title"/>
+            <p:custDataLst>
+              <p:tags r:id="rId1"/>
+            </p:custDataLst>
+          </p:nvPr>
+        </p:nvSpPr>
+        <p:spPr>
+          <a:xfrm>
+            <a:off x="4186555" y="2959735"/>
+            <a:ext cx="3827145" cy="939165"/>
+          </a:xfrm>
+        </p:spPr>
+        <p:txBody>
+          <a:bodyPr>
+            <a:normAutofit/>
+          </a:bodyPr>
+          <a:lstStyle/>
+          <a:p>
+            <a:pPr algn="ctr"/>
+            <a:r>
+              <a:rPr lang="en-US" altLang="zh-CN" dirty="0"/>
+              <a:t>Practice</a:t>
+            </a:r>
+            <a:endParaRPr lang="en-US" altLang="zh-CN" dirty="0"/>
+          </a:p>
+        </p:txBody>
+      </p:sp>
+      <p:sp>
+        <p:nvSpPr>
+          <p:cNvPr id="2" name="文本框 1"/>
+          <p:cNvSpPr txBox="1"/>
+          <p:nvPr>
+            <p:custDataLst>
+              <p:tags r:id="rId2"/>
+            </p:custDataLst>
+          </p:nvPr>
+        </p:nvSpPr>
+        <p:spPr>
+          <a:xfrm>
+            <a:off x="5622290" y="386715"/>
+            <a:ext cx="946150" cy="561975"/>
+          </a:xfrm>
+          <a:prstGeom prst="rect">
+            <a:avLst/>
+          </a:prstGeom>
+          <a:noFill/>
+        </p:spPr>
+        <p:txBody>
+          <a:bodyPr wrap="square" lIns="90000" tIns="46800" rIns="90000" bIns="46800" rtlCol="0">
+            <a:noAutofit/>
+          </a:bodyPr>
+          <a:p>
+            <a:pPr algn="dist"/>
+            <a:r>
+              <a:rPr lang="en-US" altLang="zh-CN" sz="3000">
+                <a:solidFill>
+                  <a:schemeClr val="bg1"/>
+                </a:solidFill>
+                <a:latin typeface="Arial" panose="020B0604020202020204" pitchFamily="34" charset="0"/>
+                <a:ea typeface="微软雅黑" panose="020B0503020204020204" charset="-122"/>
+              </a:rPr>
+              <a:t>C</a:t>
+            </a:r>
+            <a:endParaRPr lang="en-US" altLang="zh-CN" sz="3000">
+              <a:solidFill>
+                <a:schemeClr val="bg1"/>
+              </a:solidFill>
+              <a:latin typeface="Arial" panose="020B0604020202020204" pitchFamily="34" charset="0"/>
+              <a:ea typeface="微软雅黑" panose="020B0503020204020204" charset="-122"/>
+            </a:endParaRPr>
+          </a:p>
+        </p:txBody>
+      </p:sp>
+    </p:spTree>
+    <p:custDataLst>
+      <p:tags r:id="rId3"/>
+    </p:custDataLst>
+  </p:cSld>
+  <p:clrMapOvr>
+    <a:masterClrMapping/>
+  </p:clrMapOvr>
+</p:sld>
+</file>
+
+<file path=ppt/slides/slide24.xml><?xml version="1.0" encoding="utf-8"?>
+<p:sld xmlns:a="http://schemas.openxmlformats.org/drawingml/2006/main" xmlns:r="http://schemas.openxmlformats.org/officeDocument/2006/relationships" xmlns:p="http://schemas.openxmlformats.org/presentationml/2006/main">
+  <p:cSld>
+    <p:spTree>
+      <p:nvGrpSpPr>
+        <p:cNvPr id="1" name=""/>
+        <p:cNvGrpSpPr/>
+        <p:nvPr/>
+      </p:nvGrpSpPr>
+      <p:grpSpPr>
+        <a:xfrm>
+          <a:off x="0" y="0"/>
+          <a:ext cx="0" cy="0"/>
+          <a:chOff x="0" y="0"/>
+          <a:chExt cx="0" cy="0"/>
+        </a:xfrm>
+      </p:grpSpPr>
+      <p:sp>
+        <p:nvSpPr>
+          <p:cNvPr id="5" name="标题 4"/>
+          <p:cNvSpPr>
+            <a:spLocks noGrp="1"/>
+          </p:cNvSpPr>
+          <p:nvPr>
+            <p:ph type="title"/>
+            <p:custDataLst>
+              <p:tags r:id="rId1"/>
+            </p:custDataLst>
+          </p:nvPr>
+        </p:nvSpPr>
+        <p:spPr/>
+        <p:txBody>
+          <a:bodyPr>
+            <a:normAutofit fontScale="90000"/>
+          </a:bodyPr>
+          <a:lstStyle/>
+          <a:p>
+            <a:r>
+              <a:rPr lang="zh-CN" altLang="en-US"/>
+              <a:t>温度转换</a:t>
+            </a:r>
+            <a:endParaRPr lang="zh-CN" altLang="en-US"/>
+          </a:p>
+        </p:txBody>
+      </p:sp>
+      <mc:AlternateContent xmlns:mc="http://schemas.openxmlformats.org/markup-compatibility/2006">
+        <mc:Choice xmlns:a14="http://schemas.microsoft.com/office/drawing/2010/main" Requires="a14">
+          <p:sp>
+            <p:nvSpPr>
+              <p:cNvPr id="6" name="文本占位符 5"/>
+              <p:cNvSpPr>
+                <a:spLocks noGrp="1"/>
+              </p:cNvSpPr>
+              <p:nvPr>
+                <p:ph type="body" sz="quarter" idx="15"/>
+                <p:custDataLst>
+                  <p:tags r:id="rId2"/>
+                </p:custDataLst>
+              </p:nvPr>
+            </p:nvSpPr>
+            <p:spPr>
+              <a:xfrm>
+                <a:off x="1087120" y="1445895"/>
+                <a:ext cx="3137535" cy="1116330"/>
+              </a:xfrm>
+            </p:spPr>
+            <p:txBody>
+              <a:bodyPr>
+                <a:noAutofit/>
+              </a:bodyPr>
+              <a:lstStyle/>
+              <a:p>
+                <a:pPr algn="ctr"/>
+                <a:r>
+                  <a:rPr lang="zh-CN">
+                    <a:latin typeface="+mn-lt"/>
+                    <a:cs typeface="+mn-lt"/>
+                  </a:rPr>
+                  <a:t>输入摄氏度</a:t>
+                </a:r>
+                <a:r>
+                  <a:rPr lang="zh-CN" altLang="en-US">
+                    <a:latin typeface="+mn-lt"/>
+                    <a:cs typeface="+mn-lt"/>
+                  </a:rPr>
+                  <a:t>，输出华氏度。</a:t>
+                </a:r>
+                <a:endParaRPr lang="zh-CN" altLang="en-US">
+                  <a:latin typeface="+mn-lt"/>
+                  <a:cs typeface="+mn-lt"/>
+                </a:endParaRPr>
+              </a:p>
+              <a:p>
+                <a14:m>
+                  <m:oMathPara xmlns:m="http://schemas.openxmlformats.org/officeDocument/2006/math">
+                    <m:oMathParaPr>
+                      <m:jc m:val="centerGroup"/>
+                    </m:oMathParaPr>
+                    <m:oMath xmlns:m="http://schemas.openxmlformats.org/officeDocument/2006/math">
+                      <m:r>
+                        <a:rPr lang="en-US" altLang="zh-CN" i="1">
+                          <a:latin typeface="Cambria Math" panose="02040503050406030204" charset="0"/>
+                          <a:cs typeface="Cambria Math" panose="02040503050406030204" charset="0"/>
+                        </a:rPr>
+                        <m:t>华氏度=</m:t>
+                      </m:r>
+                      <m:r>
+                        <a:rPr lang="en-US" altLang="zh-CN" i="1">
+                          <a:latin typeface="Cambria Math" panose="02040503050406030204" charset="0"/>
+                          <a:cs typeface="Cambria Math" panose="02040503050406030204" charset="0"/>
+                        </a:rPr>
+                        <m:t>32</m:t>
+                      </m:r>
+                      <m:r>
+                        <a:rPr lang="en-US" altLang="zh-CN" i="1">
+                          <a:latin typeface="Cambria Math" panose="02040503050406030204" charset="0"/>
+                          <a:cs typeface="Cambria Math" panose="02040503050406030204" charset="0"/>
+                        </a:rPr>
+                        <m:t>+</m:t>
+                      </m:r>
+                      <m:f>
+                        <m:fPr>
+                          <m:ctrlPr>
+                            <a:rPr lang="en-US" altLang="zh-CN" i="1">
+                              <a:latin typeface="Cambria Math" panose="02040503050406030204" charset="0"/>
+                              <a:cs typeface="Cambria Math" panose="02040503050406030204" charset="0"/>
+                            </a:rPr>
+                          </m:ctrlPr>
+                        </m:fPr>
+                        <m:num>
+                          <m:r>
+                            <a:rPr lang="en-US" altLang="zh-CN" i="1">
+                              <a:latin typeface="Cambria Math" panose="02040503050406030204" charset="0"/>
+                              <a:cs typeface="Cambria Math" panose="02040503050406030204" charset="0"/>
+                            </a:rPr>
+                            <m:t>9</m:t>
+                          </m:r>
+                        </m:num>
+                        <m:den>
+                          <m:r>
+                            <a:rPr lang="en-US" altLang="zh-CN" i="1">
+                              <a:latin typeface="Cambria Math" panose="02040503050406030204" charset="0"/>
+                              <a:cs typeface="Cambria Math" panose="02040503050406030204" charset="0"/>
+                            </a:rPr>
+                            <m:t>5</m:t>
+                          </m:r>
+                        </m:den>
+                      </m:f>
+                      <m:r>
+                        <a:rPr lang="en-US" altLang="zh-CN" i="1">
+                          <a:latin typeface="Cambria Math" panose="02040503050406030204" charset="0"/>
+                          <a:cs typeface="Cambria Math" panose="02040503050406030204" charset="0"/>
+                        </a:rPr>
+                        <m:t>×</m:t>
+                      </m:r>
+                      <m:r>
+                        <a:rPr lang="en-US" altLang="zh-CN" i="1">
+                          <a:latin typeface="Cambria Math" panose="02040503050406030204" charset="0"/>
+                          <a:cs typeface="Cambria Math" panose="02040503050406030204" charset="0"/>
+                        </a:rPr>
+                        <m:t>摄氏度</m:t>
+                      </m:r>
+                    </m:oMath>
+                  </m:oMathPara>
+                </a14:m>
+                <a:endParaRPr lang="en-US" altLang="zh-CN">
+                  <a:latin typeface="+mn-lt"/>
+                  <a:cs typeface="+mn-lt"/>
+                </a:endParaRPr>
+              </a:p>
+            </p:txBody>
+          </p:sp>
+        </mc:Choice>
+        <mc:Fallback>
+          <p:sp>
+            <p:nvSpPr>
+              <p:cNvPr id="6" name="文本占位符 5"/>
+              <p:cNvSpPr>
+                <a:spLocks noRot="1" noChangeAspect="1" noMove="1" noResize="1" noEditPoints="1" noAdjustHandles="1" noChangeArrowheads="1" noChangeShapeType="1" noTextEdit="1"/>
+              </p:cNvSpPr>
+              <p:nvPr>
+                <p:ph type="body" sz="quarter" idx="15"/>
+                <p:custDataLst>
+                  <p:tags r:id="rId3"/>
+                </p:custDataLst>
+              </p:nvPr>
+            </p:nvSpPr>
+            <p:spPr>
+              <a:xfrm>
+                <a:off x="1087120" y="1445895"/>
+                <a:ext cx="3137535" cy="1116330"/>
+              </a:xfrm>
+              <a:blipFill rotWithShape="1">
+                <a:blip r:embed="rId4"/>
+                <a:stretch>
+                  <a:fillRect/>
+                </a:stretch>
+              </a:blipFill>
+            </p:spPr>
+            <p:txBody>
+              <a:bodyPr/>
+              <a:lstStyle/>
+              <a:p>
+                <a:r>
+                  <a:rPr lang="zh-CN" altLang="en-US">
+                    <a:noFill/>
+                  </a:rPr>
+                  <a:t> </a:t>
+                </a:r>
+              </a:p>
+            </p:txBody>
+          </p:sp>
+        </mc:Fallback>
+      </mc:AlternateContent>
+      <p:graphicFrame>
+        <p:nvGraphicFramePr>
+          <p:cNvPr id="3" name="表格 2"/>
+          <p:cNvGraphicFramePr/>
+          <p:nvPr>
+            <p:custDataLst>
+              <p:tags r:id="rId5"/>
+            </p:custDataLst>
+          </p:nvPr>
+        </p:nvGraphicFramePr>
+        <p:xfrm>
+          <a:off x="6744970" y="1445895"/>
+          <a:ext cx="4458970" cy="1261745"/>
+        </p:xfrm>
+        <a:graphic>
+          <a:graphicData uri="http://schemas.openxmlformats.org/drawingml/2006/table">
+            <a:tbl>
+              <a:tblPr firstRow="1" bandRow="1">
+                <a:tableStyleId>{5C22544A-7EE6-4342-B048-85BDC9FD1C3A}</a:tableStyleId>
+              </a:tblPr>
+              <a:tblGrid>
+                <a:gridCol w="4458970"/>
+              </a:tblGrid>
+              <a:tr h="1261745">
+                <a:tc>
+                  <a:txBody>
+                    <a:bodyPr/>
+                    <a:p>
+                      <a:pPr>
+                        <a:buNone/>
+                      </a:pPr>
+                      <a:r>
+                        <a:rPr lang="zh-CN" sz="1800" b="1">
+                          <a:solidFill>
+                            <a:schemeClr val="tx1"/>
+                          </a:solidFill>
+                          <a:latin typeface="Consolas" panose="020B0609020204030204" charset="0"/>
+                          <a:cs typeface="Consolas" panose="020B0609020204030204" charset="0"/>
+                          <a:sym typeface="+mn-ea"/>
+                        </a:rPr>
+                        <a:t>测试</a:t>
+                      </a:r>
+                      <a:r>
+                        <a:rPr lang="en-US" altLang="zh-CN" sz="1800" b="1">
+                          <a:solidFill>
+                            <a:schemeClr val="tx1"/>
+                          </a:solidFill>
+                          <a:latin typeface="Consolas" panose="020B0609020204030204" charset="0"/>
+                          <a:cs typeface="Consolas" panose="020B0609020204030204" charset="0"/>
+                          <a:sym typeface="+mn-ea"/>
+                        </a:rPr>
+                        <a:t>1</a:t>
+                      </a:r>
+                      <a:endParaRPr lang="en-US" altLang="zh-CN" sz="1800" b="1">
+                        <a:solidFill>
+                          <a:schemeClr val="tx1"/>
+                        </a:solidFill>
+                        <a:latin typeface="Consolas" panose="020B0609020204030204" charset="0"/>
+                        <a:cs typeface="Consolas" panose="020B0609020204030204" charset="0"/>
+                        <a:sym typeface="+mn-ea"/>
+                      </a:endParaRPr>
+                    </a:p>
+                    <a:p>
+                      <a:pPr>
+                        <a:buNone/>
+                      </a:pPr>
+                      <a:endParaRPr sz="1800" b="1">
+                        <a:solidFill>
+                          <a:schemeClr val="tx1"/>
+                        </a:solidFill>
+                        <a:latin typeface="Consolas" panose="020B0609020204030204" charset="0"/>
+                        <a:cs typeface="Consolas" panose="020B0609020204030204" charset="0"/>
+                        <a:sym typeface="+mn-ea"/>
+                      </a:endParaRPr>
+                    </a:p>
+                    <a:p>
+                      <a:pPr>
+                        <a:buNone/>
+                      </a:pPr>
+                      <a:r>
+                        <a:rPr sz="1800" b="0">
+                          <a:solidFill>
+                            <a:schemeClr val="tx1"/>
+                          </a:solidFill>
+                          <a:latin typeface="Consolas" panose="020B0609020204030204" charset="0"/>
+                          <a:cs typeface="Consolas" panose="020B0609020204030204" charset="0"/>
+                          <a:sym typeface="+mn-ea"/>
+                        </a:rPr>
+                        <a:t>Enter temperature in Celsius: 37</a:t>
+                      </a:r>
+                      <a:endParaRPr sz="1800" b="0">
+                        <a:solidFill>
+                          <a:schemeClr val="tx1"/>
+                        </a:solidFill>
+                        <a:latin typeface="Consolas" panose="020B0609020204030204" charset="0"/>
+                        <a:cs typeface="Consolas" panose="020B0609020204030204" charset="0"/>
+                        <a:sym typeface="+mn-ea"/>
+                      </a:endParaRPr>
+                    </a:p>
+                    <a:p>
+                      <a:pPr>
+                        <a:buNone/>
+                      </a:pPr>
+                      <a:r>
+                        <a:rPr sz="1800" b="0">
+                          <a:solidFill>
+                            <a:schemeClr val="tx1"/>
+                          </a:solidFill>
+                          <a:latin typeface="Consolas" panose="020B0609020204030204" charset="0"/>
+                          <a:cs typeface="Consolas" panose="020B0609020204030204" charset="0"/>
+                          <a:sym typeface="+mn-ea"/>
+                        </a:rPr>
+                        <a:t>F = 32 + 37.00 * 9 / 5 = 98.60</a:t>
+                      </a:r>
+                      <a:endParaRPr sz="1800" b="0">
+                        <a:solidFill>
+                          <a:schemeClr val="tx1"/>
+                        </a:solidFill>
+                        <a:latin typeface="Consolas" panose="020B0609020204030204" charset="0"/>
+                        <a:cs typeface="Consolas" panose="020B0609020204030204" charset="0"/>
+                        <a:sym typeface="+mn-ea"/>
+                      </a:endParaRPr>
+                    </a:p>
+                  </a:txBody>
+                  <a:tcPr>
+                    <a:solidFill>
+                      <a:schemeClr val="accent6">
+                        <a:lumMod val="20000"/>
+                        <a:lumOff val="80000"/>
+                      </a:schemeClr>
+                    </a:solidFill>
+                  </a:tcPr>
+                </a:tc>
+              </a:tr>
+            </a:tbl>
+          </a:graphicData>
+        </a:graphic>
+      </p:graphicFrame>
+      <p:graphicFrame>
+        <p:nvGraphicFramePr>
+          <p:cNvPr id="4" name="表格 3"/>
+          <p:cNvGraphicFramePr/>
+          <p:nvPr>
+            <p:custDataLst>
+              <p:tags r:id="rId6"/>
+            </p:custDataLst>
+          </p:nvPr>
+        </p:nvGraphicFramePr>
+        <p:xfrm>
+          <a:off x="6744970" y="3474085"/>
+          <a:ext cx="4459605" cy="1261745"/>
+        </p:xfrm>
+        <a:graphic>
+          <a:graphicData uri="http://schemas.openxmlformats.org/drawingml/2006/table">
+            <a:tbl>
+              <a:tblPr firstRow="1" bandRow="1">
+                <a:tableStyleId>{5C22544A-7EE6-4342-B048-85BDC9FD1C3A}</a:tableStyleId>
+              </a:tblPr>
+              <a:tblGrid>
+                <a:gridCol w="4459605"/>
+              </a:tblGrid>
+              <a:tr h="1261745">
+                <a:tc>
+                  <a:txBody>
+                    <a:bodyPr/>
+                    <a:p>
+                      <a:pPr>
+                        <a:buNone/>
+                      </a:pPr>
+                      <a:r>
+                        <a:rPr lang="zh-CN" sz="1800" b="1">
+                          <a:solidFill>
+                            <a:schemeClr val="tx1"/>
+                          </a:solidFill>
+                          <a:latin typeface="Consolas" panose="020B0609020204030204" charset="0"/>
+                          <a:cs typeface="Consolas" panose="020B0609020204030204" charset="0"/>
+                          <a:sym typeface="+mn-ea"/>
+                        </a:rPr>
+                        <a:t>测试</a:t>
+                      </a:r>
+                      <a:r>
+                        <a:rPr lang="en-US" altLang="zh-CN" sz="1800" b="1">
+                          <a:solidFill>
+                            <a:schemeClr val="tx1"/>
+                          </a:solidFill>
+                          <a:latin typeface="Consolas" panose="020B0609020204030204" charset="0"/>
+                          <a:cs typeface="Consolas" panose="020B0609020204030204" charset="0"/>
+                          <a:sym typeface="+mn-ea"/>
+                        </a:rPr>
+                        <a:t>2</a:t>
+                      </a:r>
+                      <a:endParaRPr lang="en-US" altLang="zh-CN" sz="1800" b="1">
+                        <a:solidFill>
+                          <a:schemeClr val="tx1"/>
+                        </a:solidFill>
+                        <a:latin typeface="Consolas" panose="020B0609020204030204" charset="0"/>
+                        <a:cs typeface="Consolas" panose="020B0609020204030204" charset="0"/>
+                        <a:sym typeface="+mn-ea"/>
+                      </a:endParaRPr>
+                    </a:p>
+                    <a:p>
+                      <a:pPr>
+                        <a:buNone/>
+                      </a:pPr>
+                      <a:endParaRPr sz="1800" b="1">
+                        <a:solidFill>
+                          <a:schemeClr val="tx1"/>
+                        </a:solidFill>
+                        <a:latin typeface="Consolas" panose="020B0609020204030204" charset="0"/>
+                        <a:cs typeface="Consolas" panose="020B0609020204030204" charset="0"/>
+                        <a:sym typeface="+mn-ea"/>
+                      </a:endParaRPr>
+                    </a:p>
+                    <a:p>
+                      <a:pPr>
+                        <a:buNone/>
+                      </a:pPr>
+                      <a:r>
+                        <a:rPr sz="1800" b="0">
+                          <a:solidFill>
+                            <a:schemeClr val="tx1"/>
+                          </a:solidFill>
+                          <a:latin typeface="Consolas" panose="020B0609020204030204" charset="0"/>
+                          <a:cs typeface="Consolas" panose="020B0609020204030204" charset="0"/>
+                          <a:sym typeface="+mn-ea"/>
+                        </a:rPr>
+                        <a:t>Enter temperature in Celsius: 38.5</a:t>
+                      </a:r>
+                      <a:endParaRPr sz="1800" b="0">
+                        <a:solidFill>
+                          <a:schemeClr val="tx1"/>
+                        </a:solidFill>
+                        <a:latin typeface="Consolas" panose="020B0609020204030204" charset="0"/>
+                        <a:cs typeface="Consolas" panose="020B0609020204030204" charset="0"/>
+                        <a:sym typeface="+mn-ea"/>
+                      </a:endParaRPr>
+                    </a:p>
+                    <a:p>
+                      <a:pPr>
+                        <a:buNone/>
+                      </a:pPr>
+                      <a:r>
+                        <a:rPr sz="1800" b="0">
+                          <a:solidFill>
+                            <a:schemeClr val="tx1"/>
+                          </a:solidFill>
+                          <a:latin typeface="Consolas" panose="020B0609020204030204" charset="0"/>
+                          <a:cs typeface="Consolas" panose="020B0609020204030204" charset="0"/>
+                          <a:sym typeface="+mn-ea"/>
+                        </a:rPr>
+                        <a:t>F = 32 + 38.50 * 9 / 5 = 101.30</a:t>
+                      </a:r>
+                      <a:endParaRPr sz="1800" b="0">
+                        <a:solidFill>
+                          <a:schemeClr val="tx1"/>
+                        </a:solidFill>
+                        <a:latin typeface="Consolas" panose="020B0609020204030204" charset="0"/>
+                        <a:cs typeface="Consolas" panose="020B0609020204030204" charset="0"/>
+                        <a:sym typeface="+mn-ea"/>
+                      </a:endParaRPr>
+                    </a:p>
+                  </a:txBody>
+                  <a:tcPr>
+                    <a:solidFill>
+                      <a:schemeClr val="accent6">
+                        <a:lumMod val="20000"/>
+                        <a:lumOff val="80000"/>
+                      </a:schemeClr>
+                    </a:solidFill>
+                  </a:tcPr>
+                </a:tc>
+              </a:tr>
+            </a:tbl>
+          </a:graphicData>
+        </a:graphic>
+      </p:graphicFrame>
+    </p:spTree>
+    <p:custDataLst>
+      <p:tags r:id="rId7"/>
+    </p:custDataLst>
+  </p:cSld>
+  <p:clrMapOvr>
+    <a:masterClrMapping/>
+  </p:clrMapOvr>
+</p:sld>
+</file>
+
+<file path=ppt/slides/slide25.xml><?xml version="1.0" encoding="utf-8"?>
+<p:sld xmlns:a="http://schemas.openxmlformats.org/drawingml/2006/main" xmlns:r="http://schemas.openxmlformats.org/officeDocument/2006/relationships" xmlns:p="http://schemas.openxmlformats.org/presentationml/2006/main">
+  <p:cSld>
+    <p:spTree>
+      <p:nvGrpSpPr>
+        <p:cNvPr id="1" name=""/>
+        <p:cNvGrpSpPr/>
+        <p:nvPr/>
+      </p:nvGrpSpPr>
+      <p:grpSpPr>
+        <a:xfrm>
+          <a:off x="0" y="0"/>
+          <a:ext cx="0" cy="0"/>
+          <a:chOff x="0" y="0"/>
+          <a:chExt cx="0" cy="0"/>
+        </a:xfrm>
+      </p:grpSpPr>
+      <p:sp>
+        <p:nvSpPr>
+          <p:cNvPr id="5" name="标题 4"/>
+          <p:cNvSpPr>
+            <a:spLocks noGrp="1"/>
+          </p:cNvSpPr>
+          <p:nvPr>
+            <p:ph type="title"/>
+            <p:custDataLst>
+              <p:tags r:id="rId1"/>
+            </p:custDataLst>
+          </p:nvPr>
+        </p:nvSpPr>
+        <p:spPr/>
+        <p:txBody>
+          <a:bodyPr>
+            <a:normAutofit fontScale="90000"/>
+          </a:bodyPr>
+          <a:lstStyle/>
+          <a:p>
+            <a:r>
+              <a:rPr lang="zh-CN" altLang="en-US"/>
+              <a:t>时间转换</a:t>
+            </a:r>
+            <a:endParaRPr lang="zh-CN" altLang="en-US"/>
+          </a:p>
+        </p:txBody>
+      </p:sp>
+      <p:graphicFrame>
+        <p:nvGraphicFramePr>
+          <p:cNvPr id="3" name="表格 2"/>
+          <p:cNvGraphicFramePr/>
+          <p:nvPr>
+            <p:custDataLst>
+              <p:tags r:id="rId2"/>
+            </p:custDataLst>
+          </p:nvPr>
+        </p:nvGraphicFramePr>
+        <p:xfrm>
+          <a:off x="2791460" y="1789430"/>
+          <a:ext cx="6708140" cy="1261745"/>
+        </p:xfrm>
+        <a:graphic>
+          <a:graphicData uri="http://schemas.openxmlformats.org/drawingml/2006/table">
+            <a:tbl>
+              <a:tblPr firstRow="1" bandRow="1">
+                <a:tableStyleId>{5C22544A-7EE6-4342-B048-85BDC9FD1C3A}</a:tableStyleId>
+              </a:tblPr>
+              <a:tblGrid>
+                <a:gridCol w="6708140"/>
+              </a:tblGrid>
+              <a:tr h="1261745">
+                <a:tc>
+                  <a:txBody>
+                    <a:bodyPr/>
+                    <a:p>
+                      <a:pPr>
+                        <a:buNone/>
+                      </a:pPr>
+                      <a:r>
+                        <a:rPr lang="zh-CN" sz="1800" b="1">
+                          <a:solidFill>
+                            <a:schemeClr val="tx1"/>
+                          </a:solidFill>
+                          <a:latin typeface="Consolas" panose="020B0609020204030204" charset="0"/>
+                          <a:cs typeface="Consolas" panose="020B0609020204030204" charset="0"/>
+                          <a:sym typeface="+mn-ea"/>
+                        </a:rPr>
+                        <a:t>测试</a:t>
+                      </a:r>
+                      <a:r>
+                        <a:rPr lang="en-US" altLang="zh-CN" sz="1800" b="1">
+                          <a:solidFill>
+                            <a:schemeClr val="tx1"/>
+                          </a:solidFill>
+                          <a:latin typeface="Consolas" panose="020B0609020204030204" charset="0"/>
+                          <a:cs typeface="Consolas" panose="020B0609020204030204" charset="0"/>
+                          <a:sym typeface="+mn-ea"/>
+                        </a:rPr>
+                        <a:t>1</a:t>
+                      </a:r>
+                      <a:endParaRPr lang="en-US" altLang="zh-CN" sz="1800" b="1">
+                        <a:solidFill>
+                          <a:schemeClr val="tx1"/>
+                        </a:solidFill>
+                        <a:latin typeface="Consolas" panose="020B0609020204030204" charset="0"/>
+                        <a:cs typeface="Consolas" panose="020B0609020204030204" charset="0"/>
+                        <a:sym typeface="+mn-ea"/>
+                      </a:endParaRPr>
+                    </a:p>
+                    <a:p>
+                      <a:pPr>
+                        <a:buNone/>
+                      </a:pPr>
+                      <a:endParaRPr sz="1800" b="1">
+                        <a:solidFill>
+                          <a:schemeClr val="tx1"/>
+                        </a:solidFill>
+                        <a:latin typeface="Consolas" panose="020B0609020204030204" charset="0"/>
+                        <a:cs typeface="Consolas" panose="020B0609020204030204" charset="0"/>
+                        <a:sym typeface="+mn-ea"/>
+                      </a:endParaRPr>
+                    </a:p>
+                    <a:p>
+                      <a:pPr>
+                        <a:buNone/>
+                      </a:pPr>
+                      <a:r>
+                        <a:rPr sz="1800" b="0">
+                          <a:solidFill>
+                            <a:schemeClr val="tx1"/>
+                          </a:solidFill>
+                          <a:latin typeface="Consolas" panose="020B0609020204030204" charset="0"/>
+                          <a:cs typeface="Consolas" panose="020B0609020204030204" charset="0"/>
+                          <a:sym typeface="+mn-ea"/>
+                        </a:rPr>
+                        <a:t>Enter total seconds: 3600</a:t>
+                      </a:r>
+                      <a:endParaRPr sz="1800" b="0">
+                        <a:solidFill>
+                          <a:schemeClr val="tx1"/>
+                        </a:solidFill>
+                        <a:latin typeface="Consolas" panose="020B0609020204030204" charset="0"/>
+                        <a:cs typeface="Consolas" panose="020B0609020204030204" charset="0"/>
+                        <a:sym typeface="+mn-ea"/>
+                      </a:endParaRPr>
+                    </a:p>
+                    <a:p>
+                      <a:pPr>
+                        <a:buNone/>
+                      </a:pPr>
+                      <a:r>
+                        <a:rPr sz="1800" b="0">
+                          <a:solidFill>
+                            <a:schemeClr val="tx1"/>
+                          </a:solidFill>
+                          <a:latin typeface="Consolas" panose="020B0609020204030204" charset="0"/>
+                          <a:cs typeface="Consolas" panose="020B0609020204030204" charset="0"/>
+                          <a:sym typeface="+mn-ea"/>
+                        </a:rPr>
+                        <a:t>3600 second(s) = 1 hour(s) 0 minute(s) 0 second(s)</a:t>
+                      </a:r>
+                      <a:endParaRPr sz="1800" b="0">
+                        <a:solidFill>
+                          <a:schemeClr val="tx1"/>
+                        </a:solidFill>
+                        <a:latin typeface="Consolas" panose="020B0609020204030204" charset="0"/>
+                        <a:cs typeface="Consolas" panose="020B0609020204030204" charset="0"/>
+                        <a:sym typeface="+mn-ea"/>
+                      </a:endParaRPr>
+                    </a:p>
+                  </a:txBody>
+                  <a:tcPr>
+                    <a:solidFill>
+                      <a:schemeClr val="accent6">
+                        <a:lumMod val="20000"/>
+                        <a:lumOff val="80000"/>
+                      </a:schemeClr>
+                    </a:solidFill>
+                  </a:tcPr>
+                </a:tc>
+              </a:tr>
+            </a:tbl>
+          </a:graphicData>
+        </a:graphic>
+      </p:graphicFrame>
+      <p:sp>
+        <p:nvSpPr>
+          <p:cNvPr id="2" name="文本占位符 5"/>
+          <p:cNvSpPr>
+            <a:spLocks noGrp="1"/>
+          </p:cNvSpPr>
+          <p:nvPr>
+            <p:custDataLst>
+              <p:tags r:id="rId3"/>
+            </p:custDataLst>
+          </p:nvPr>
+        </p:nvSpPr>
+        <p:spPr>
+          <a:xfrm>
+            <a:off x="1082675" y="1209040"/>
+            <a:ext cx="4139565" cy="580390"/>
+          </a:xfrm>
+          <a:prstGeom prst="rect">
+            <a:avLst/>
+          </a:prstGeom>
+        </p:spPr>
+        <p:txBody>
+          <a:bodyPr vert="horz" lIns="90000" tIns="46800" rIns="90000" bIns="46800" rtlCol="0">
+            <a:noAutofit/>
+          </a:bodyPr>
+          <a:lstStyle>
+            <a:lvl1pPr marL="0" indent="0" algn="l" defTabSz="914400" rtl="0" eaLnBrk="1" fontAlgn="auto" latinLnBrk="0" hangingPunct="1">
+              <a:lnSpc>
+                <a:spcPct val="130000"/>
+              </a:lnSpc>
+              <a:spcBef>
+                <a:spcPts val="0"/>
+              </a:spcBef>
+              <a:spcAft>
+                <a:spcPts val="1000"/>
+              </a:spcAft>
+              <a:buFont typeface="Arial" panose="020B0604020202020204" pitchFamily="34" charset="0"/>
+              <a:buNone/>
+              <a:defRPr sz="1600" u="none" strike="noStrike" kern="1200" cap="none" spc="150" normalizeH="0" baseline="0">
+                <a:solidFill>
+                  <a:schemeClr val="tx1">
+                    <a:lumMod val="85000"/>
+                    <a:lumOff val="15000"/>
+                  </a:schemeClr>
+                </a:solidFill>
+                <a:uFillTx/>
+                <a:latin typeface="Arial" panose="020B0604020202020204" pitchFamily="34" charset="0"/>
+                <a:ea typeface="微软雅黑" panose="020B0503020204020204" charset="-122"/>
+                <a:cs typeface="+mn-cs"/>
+              </a:defRPr>
+            </a:lvl1pPr>
+            <a:lvl2pPr marL="685800" indent="-228600" algn="l" defTabSz="914400" rtl="0" eaLnBrk="1" fontAlgn="auto" latinLnBrk="0" hangingPunct="1">
+              <a:lnSpc>
+                <a:spcPct val="130000"/>
+              </a:lnSpc>
+              <a:spcBef>
+                <a:spcPts val="0"/>
+              </a:spcBef>
+              <a:spcAft>
+                <a:spcPts val="1000"/>
+              </a:spcAft>
+              <a:buFont typeface="Arial" panose="020B0604020202020204" pitchFamily="34" charset="0"/>
+              <a:buChar char="•"/>
+              <a:tabLst>
+                <a:tab pos="1609725" algn="l"/>
+              </a:tabLst>
+              <a:defRPr sz="1600" u="none" strike="noStrike" kern="1200" cap="none" spc="150" normalizeH="0" baseline="0">
+                <a:solidFill>
+                  <a:schemeClr val="tx1">
+                    <a:lumMod val="85000"/>
+                    <a:lumOff val="15000"/>
+                  </a:schemeClr>
+                </a:solidFill>
+                <a:uFillTx/>
+                <a:latin typeface="Arial" panose="020B0604020202020204" pitchFamily="34" charset="0"/>
+                <a:ea typeface="微软雅黑" panose="020B0503020204020204" charset="-122"/>
+                <a:cs typeface="+mn-cs"/>
+              </a:defRPr>
+            </a:lvl2pPr>
+            <a:lvl3pPr marL="1143000" indent="-228600" algn="l" defTabSz="914400" rtl="0" eaLnBrk="1" fontAlgn="auto" latinLnBrk="0" hangingPunct="1">
+              <a:lnSpc>
+                <a:spcPct val="130000"/>
+              </a:lnSpc>
+              <a:spcBef>
+                <a:spcPts val="0"/>
+              </a:spcBef>
+              <a:spcAft>
+                <a:spcPts val="1000"/>
+              </a:spcAft>
+              <a:buFont typeface="Arial" panose="020B0604020202020204" pitchFamily="34" charset="0"/>
+              <a:buChar char="•"/>
+              <a:defRPr sz="1600" u="none" strike="noStrike" kern="1200" cap="none" spc="150" normalizeH="0" baseline="0">
+                <a:solidFill>
+                  <a:schemeClr val="tx1">
+                    <a:lumMod val="85000"/>
+                    <a:lumOff val="15000"/>
+                  </a:schemeClr>
+                </a:solidFill>
+                <a:uFillTx/>
+                <a:latin typeface="Arial" panose="020B0604020202020204" pitchFamily="34" charset="0"/>
+                <a:ea typeface="微软雅黑" panose="020B0503020204020204" charset="-122"/>
+                <a:cs typeface="+mn-cs"/>
+              </a:defRPr>
+            </a:lvl3pPr>
+            <a:lvl4pPr marL="1600200" indent="-228600" algn="l" defTabSz="914400" rtl="0" eaLnBrk="1" fontAlgn="auto" latinLnBrk="0" hangingPunct="1">
+              <a:lnSpc>
+                <a:spcPct val="130000"/>
+              </a:lnSpc>
+              <a:spcBef>
+                <a:spcPts val="0"/>
+              </a:spcBef>
+              <a:spcAft>
+                <a:spcPts val="1000"/>
+              </a:spcAft>
+              <a:buFont typeface="Arial" panose="020B0604020202020204" pitchFamily="34" charset="0"/>
+              <a:buChar char="•"/>
+              <a:defRPr sz="1600" u="none" strike="noStrike" kern="1200" cap="none" spc="150" normalizeH="0" baseline="0">
+                <a:solidFill>
+                  <a:schemeClr val="tx1">
+                    <a:lumMod val="85000"/>
+                    <a:lumOff val="15000"/>
+                  </a:schemeClr>
+                </a:solidFill>
+                <a:uFillTx/>
+                <a:latin typeface="Arial" panose="020B0604020202020204" pitchFamily="34" charset="0"/>
+                <a:ea typeface="微软雅黑" panose="020B0503020204020204" charset="-122"/>
+                <a:cs typeface="+mn-cs"/>
+              </a:defRPr>
+            </a:lvl4pPr>
+            <a:lvl5pPr marL="2057400" indent="-228600" algn="l" defTabSz="914400" rtl="0" eaLnBrk="1" fontAlgn="auto" latinLnBrk="0" hangingPunct="1">
+              <a:lnSpc>
+                <a:spcPct val="130000"/>
+              </a:lnSpc>
+              <a:spcBef>
+                <a:spcPts val="0"/>
+              </a:spcBef>
+              <a:spcAft>
+                <a:spcPts val="1000"/>
+              </a:spcAft>
+              <a:buFont typeface="Arial" panose="020B0604020202020204" pitchFamily="34" charset="0"/>
+              <a:buChar char="•"/>
+              <a:defRPr sz="1600" u="none" strike="noStrike" kern="1200" cap="none" spc="150" normalizeH="0" baseline="0">
+                <a:solidFill>
+                  <a:schemeClr val="tx1">
+                    <a:lumMod val="85000"/>
+                    <a:lumOff val="15000"/>
+                  </a:schemeClr>
+                </a:solidFill>
+                <a:uFillTx/>
+                <a:latin typeface="Arial" panose="020B0604020202020204" pitchFamily="34" charset="0"/>
+                <a:ea typeface="微软雅黑" panose="020B0503020204020204" charset="-122"/>
+                <a:cs typeface="+mn-cs"/>
+              </a:defRPr>
+            </a:lvl5pPr>
+            <a:lvl6pPr marL="2514600" indent="-228600" algn="l" defTabSz="914400" rtl="0" eaLnBrk="1" latinLnBrk="0" hangingPunct="1">
+              <a:lnSpc>
+                <a:spcPct val="90000"/>
+              </a:lnSpc>
+              <a:spcBef>
+                <a:spcPts val="500"/>
+              </a:spcBef>
+              <a:buFont typeface="Arial" panose="020B0604020202020204" pitchFamily="34" charset="0"/>
+              <a:buChar char="•"/>
+              <a:defRPr sz="1800" kern="1200">
+                <a:solidFill>
+                  <a:schemeClr val="tx1"/>
+                </a:solidFill>
+                <a:latin typeface="+mn-lt"/>
+                <a:ea typeface="+mn-ea"/>
+                <a:cs typeface="+mn-cs"/>
+              </a:defRPr>
+            </a:lvl6pPr>
+            <a:lvl7pPr marL="2971800" indent="-228600" algn="l" defTabSz="914400" rtl="0" eaLnBrk="1" latinLnBrk="0" hangingPunct="1">
+              <a:lnSpc>
+                <a:spcPct val="90000"/>
+              </a:lnSpc>
+              <a:spcBef>
+                <a:spcPts val="500"/>
+              </a:spcBef>
+              <a:buFont typeface="Arial" panose="020B0604020202020204" pitchFamily="34" charset="0"/>
+              <a:buChar char="•"/>
+              <a:defRPr sz="1800" kern="1200">
+                <a:solidFill>
+                  <a:schemeClr val="tx1"/>
+                </a:solidFill>
+                <a:latin typeface="+mn-lt"/>
+                <a:ea typeface="+mn-ea"/>
+                <a:cs typeface="+mn-cs"/>
+              </a:defRPr>
+            </a:lvl7pPr>
+            <a:lvl8pPr marL="3429000" indent="-228600" algn="l" defTabSz="914400" rtl="0" eaLnBrk="1" latinLnBrk="0" hangingPunct="1">
+              <a:lnSpc>
+                <a:spcPct val="90000"/>
+              </a:lnSpc>
+              <a:spcBef>
+                <a:spcPts val="500"/>
+              </a:spcBef>
+              <a:buFont typeface="Arial" panose="020B0604020202020204" pitchFamily="34" charset="0"/>
+              <a:buChar char="•"/>
+              <a:defRPr sz="1800" kern="1200">
+                <a:solidFill>
+                  <a:schemeClr val="tx1"/>
+                </a:solidFill>
+                <a:latin typeface="+mn-lt"/>
+                <a:ea typeface="+mn-ea"/>
+                <a:cs typeface="+mn-cs"/>
+              </a:defRPr>
+            </a:lvl8pPr>
+            <a:lvl9pPr marL="3886200" indent="-228600" algn="l" defTabSz="914400" rtl="0" eaLnBrk="1" latinLnBrk="0" hangingPunct="1">
+              <a:lnSpc>
+                <a:spcPct val="90000"/>
+              </a:lnSpc>
+              <a:spcBef>
+                <a:spcPts val="500"/>
+              </a:spcBef>
+              <a:buFont typeface="Arial" panose="020B0604020202020204" pitchFamily="34" charset="0"/>
+              <a:buChar char="•"/>
+              <a:defRPr sz="1800" kern="1200">
+                <a:solidFill>
+                  <a:schemeClr val="tx1"/>
+                </a:solidFill>
+                <a:latin typeface="+mn-lt"/>
+                <a:ea typeface="+mn-ea"/>
+                <a:cs typeface="+mn-cs"/>
+              </a:defRPr>
+            </a:lvl9pPr>
+          </a:lstStyle>
+          <a:p>
+            <a:r>
+              <a:rPr lang="zh-CN">
+                <a:latin typeface="+mn-lt"/>
+                <a:cs typeface="+mn-lt"/>
+              </a:rPr>
+              <a:t>输入总秒数，输出对应的时、分、秒。</a:t>
+            </a:r>
+            <a:endParaRPr>
+              <a:latin typeface="+mn-lt"/>
+              <a:cs typeface="+mn-lt"/>
+            </a:endParaRPr>
+          </a:p>
+        </p:txBody>
+      </p:sp>
+      <p:graphicFrame>
+        <p:nvGraphicFramePr>
+          <p:cNvPr id="8" name="表格 7"/>
+          <p:cNvGraphicFramePr/>
+          <p:nvPr>
+            <p:custDataLst>
+              <p:tags r:id="rId4"/>
+            </p:custDataLst>
+          </p:nvPr>
+        </p:nvGraphicFramePr>
+        <p:xfrm>
+          <a:off x="2788285" y="3380740"/>
+          <a:ext cx="6708775" cy="1261745"/>
+        </p:xfrm>
+        <a:graphic>
+          <a:graphicData uri="http://schemas.openxmlformats.org/drawingml/2006/table">
+            <a:tbl>
+              <a:tblPr firstRow="1" bandRow="1">
+                <a:tableStyleId>{5C22544A-7EE6-4342-B048-85BDC9FD1C3A}</a:tableStyleId>
+              </a:tblPr>
+              <a:tblGrid>
+                <a:gridCol w="6708775"/>
+              </a:tblGrid>
+              <a:tr h="1261745">
+                <a:tc>
+                  <a:txBody>
+                    <a:bodyPr/>
+                    <a:p>
+                      <a:pPr>
+                        <a:buNone/>
+                      </a:pPr>
+                      <a:r>
+                        <a:rPr lang="zh-CN" sz="1800" b="1">
+                          <a:solidFill>
+                            <a:schemeClr val="tx1"/>
+                          </a:solidFill>
+                          <a:latin typeface="Consolas" panose="020B0609020204030204" charset="0"/>
+                          <a:cs typeface="Consolas" panose="020B0609020204030204" charset="0"/>
+                          <a:sym typeface="+mn-ea"/>
+                        </a:rPr>
+                        <a:t>测试</a:t>
+                      </a:r>
+                      <a:r>
+                        <a:rPr lang="en-US" altLang="zh-CN" sz="1800" b="1">
+                          <a:solidFill>
+                            <a:schemeClr val="tx1"/>
+                          </a:solidFill>
+                          <a:latin typeface="Consolas" panose="020B0609020204030204" charset="0"/>
+                          <a:cs typeface="Consolas" panose="020B0609020204030204" charset="0"/>
+                          <a:sym typeface="+mn-ea"/>
+                        </a:rPr>
+                        <a:t>2</a:t>
+                      </a:r>
+                      <a:endParaRPr lang="en-US" altLang="zh-CN" sz="1800" b="1">
+                        <a:solidFill>
+                          <a:schemeClr val="tx1"/>
+                        </a:solidFill>
+                        <a:latin typeface="Consolas" panose="020B0609020204030204" charset="0"/>
+                        <a:cs typeface="Consolas" panose="020B0609020204030204" charset="0"/>
+                        <a:sym typeface="+mn-ea"/>
+                      </a:endParaRPr>
+                    </a:p>
+                    <a:p>
+                      <a:pPr>
+                        <a:buNone/>
+                      </a:pPr>
+                      <a:endParaRPr sz="1800" b="1">
+                        <a:solidFill>
+                          <a:schemeClr val="tx1"/>
+                        </a:solidFill>
+                        <a:latin typeface="Consolas" panose="020B0609020204030204" charset="0"/>
+                        <a:cs typeface="Consolas" panose="020B0609020204030204" charset="0"/>
+                        <a:sym typeface="+mn-ea"/>
+                      </a:endParaRPr>
+                    </a:p>
+                    <a:p>
+                      <a:pPr>
+                        <a:buNone/>
+                      </a:pPr>
+                      <a:r>
+                        <a:rPr sz="1800" b="0">
+                          <a:solidFill>
+                            <a:schemeClr val="tx1"/>
+                          </a:solidFill>
+                          <a:latin typeface="Consolas" panose="020B0609020204030204" charset="0"/>
+                          <a:cs typeface="Consolas" panose="020B0609020204030204" charset="0"/>
+                          <a:sym typeface="+mn-ea"/>
+                        </a:rPr>
+                        <a:t>Enter total seconds: 528</a:t>
+                      </a:r>
+                      <a:endParaRPr sz="1800" b="0">
+                        <a:solidFill>
+                          <a:schemeClr val="tx1"/>
+                        </a:solidFill>
+                        <a:latin typeface="Consolas" panose="020B0609020204030204" charset="0"/>
+                        <a:cs typeface="Consolas" panose="020B0609020204030204" charset="0"/>
+                        <a:sym typeface="+mn-ea"/>
+                      </a:endParaRPr>
+                    </a:p>
+                    <a:p>
+                      <a:pPr>
+                        <a:buNone/>
+                      </a:pPr>
+                      <a:r>
+                        <a:rPr sz="1800" b="0">
+                          <a:solidFill>
+                            <a:schemeClr val="tx1"/>
+                          </a:solidFill>
+                          <a:latin typeface="Consolas" panose="020B0609020204030204" charset="0"/>
+                          <a:cs typeface="Consolas" panose="020B0609020204030204" charset="0"/>
+                          <a:sym typeface="+mn-ea"/>
+                        </a:rPr>
+                        <a:t>528 second(s) = 0 hour(s) 8 minute(s) 48 second(s)</a:t>
+                      </a:r>
+                      <a:endParaRPr sz="1800" b="0">
+                        <a:solidFill>
+                          <a:schemeClr val="tx1"/>
+                        </a:solidFill>
+                        <a:latin typeface="Consolas" panose="020B0609020204030204" charset="0"/>
+                        <a:cs typeface="Consolas" panose="020B0609020204030204" charset="0"/>
+                        <a:sym typeface="+mn-ea"/>
+                      </a:endParaRPr>
+                    </a:p>
+                  </a:txBody>
+                  <a:tcPr>
+                    <a:solidFill>
+                      <a:schemeClr val="accent6">
+                        <a:lumMod val="20000"/>
+                        <a:lumOff val="80000"/>
+                      </a:schemeClr>
+                    </a:solidFill>
+                  </a:tcPr>
+                </a:tc>
+              </a:tr>
+            </a:tbl>
+          </a:graphicData>
+        </a:graphic>
+      </p:graphicFrame>
+      <p:graphicFrame>
+        <p:nvGraphicFramePr>
+          <p:cNvPr id="9" name="表格 8"/>
+          <p:cNvGraphicFramePr/>
+          <p:nvPr>
+            <p:custDataLst>
+              <p:tags r:id="rId5"/>
+            </p:custDataLst>
+          </p:nvPr>
+        </p:nvGraphicFramePr>
+        <p:xfrm>
+          <a:off x="2791460" y="4972050"/>
+          <a:ext cx="6689090" cy="1261745"/>
+        </p:xfrm>
+        <a:graphic>
+          <a:graphicData uri="http://schemas.openxmlformats.org/drawingml/2006/table">
+            <a:tbl>
+              <a:tblPr firstRow="1" bandRow="1">
+                <a:tableStyleId>{5C22544A-7EE6-4342-B048-85BDC9FD1C3A}</a:tableStyleId>
+              </a:tblPr>
+              <a:tblGrid>
+                <a:gridCol w="6689090"/>
+              </a:tblGrid>
+              <a:tr h="1261745">
+                <a:tc>
+                  <a:txBody>
+                    <a:bodyPr/>
+                    <a:p>
+                      <a:pPr>
+                        <a:buNone/>
+                      </a:pPr>
+                      <a:r>
+                        <a:rPr lang="zh-CN" sz="1800" b="1">
+                          <a:solidFill>
+                            <a:schemeClr val="tx1"/>
+                          </a:solidFill>
+                          <a:latin typeface="Consolas" panose="020B0609020204030204" charset="0"/>
+                          <a:cs typeface="Consolas" panose="020B0609020204030204" charset="0"/>
+                          <a:sym typeface="+mn-ea"/>
+                        </a:rPr>
+                        <a:t>测试</a:t>
+                      </a:r>
+                      <a:r>
+                        <a:rPr lang="en-US" altLang="zh-CN" sz="1800" b="1">
+                          <a:solidFill>
+                            <a:schemeClr val="tx1"/>
+                          </a:solidFill>
+                          <a:latin typeface="Consolas" panose="020B0609020204030204" charset="0"/>
+                          <a:cs typeface="Consolas" panose="020B0609020204030204" charset="0"/>
+                          <a:sym typeface="+mn-ea"/>
+                        </a:rPr>
+                        <a:t>3</a:t>
+                      </a:r>
+                      <a:endParaRPr lang="en-US" altLang="zh-CN" sz="1800" b="1">
+                        <a:solidFill>
+                          <a:schemeClr val="tx1"/>
+                        </a:solidFill>
+                        <a:latin typeface="Consolas" panose="020B0609020204030204" charset="0"/>
+                        <a:cs typeface="Consolas" panose="020B0609020204030204" charset="0"/>
+                        <a:sym typeface="+mn-ea"/>
+                      </a:endParaRPr>
+                    </a:p>
+                    <a:p>
+                      <a:pPr>
+                        <a:buNone/>
+                      </a:pPr>
+                      <a:endParaRPr sz="1800" b="1">
+                        <a:solidFill>
+                          <a:schemeClr val="tx1"/>
+                        </a:solidFill>
+                        <a:latin typeface="Consolas" panose="020B0609020204030204" charset="0"/>
+                        <a:cs typeface="Consolas" panose="020B0609020204030204" charset="0"/>
+                        <a:sym typeface="+mn-ea"/>
+                      </a:endParaRPr>
+                    </a:p>
+                    <a:p>
+                      <a:pPr>
+                        <a:buNone/>
+                      </a:pPr>
+                      <a:r>
+                        <a:rPr sz="1800" b="0">
+                          <a:solidFill>
+                            <a:schemeClr val="tx1"/>
+                          </a:solidFill>
+                          <a:latin typeface="Consolas" panose="020B0609020204030204" charset="0"/>
+                          <a:cs typeface="Consolas" panose="020B0609020204030204" charset="0"/>
+                          <a:sym typeface="+mn-ea"/>
+                        </a:rPr>
+                        <a:t>EnEnter total seconds: 9876</a:t>
+                      </a:r>
+                      <a:endParaRPr sz="1800" b="0">
+                        <a:solidFill>
+                          <a:schemeClr val="tx1"/>
+                        </a:solidFill>
+                        <a:latin typeface="Consolas" panose="020B0609020204030204" charset="0"/>
+                        <a:cs typeface="Consolas" panose="020B0609020204030204" charset="0"/>
+                        <a:sym typeface="+mn-ea"/>
+                      </a:endParaRPr>
+                    </a:p>
+                    <a:p>
+                      <a:pPr>
+                        <a:buNone/>
+                      </a:pPr>
+                      <a:r>
+                        <a:rPr sz="1800" b="0">
+                          <a:solidFill>
+                            <a:schemeClr val="tx1"/>
+                          </a:solidFill>
+                          <a:latin typeface="Consolas" panose="020B0609020204030204" charset="0"/>
+                          <a:cs typeface="Consolas" panose="020B0609020204030204" charset="0"/>
+                          <a:sym typeface="+mn-ea"/>
+                        </a:rPr>
+                        <a:t>9876 second(s) = 2 hour(s) 44 minute(s) 36 second(s)</a:t>
+                      </a:r>
+                      <a:endParaRPr sz="1800" b="0">
+                        <a:solidFill>
+                          <a:schemeClr val="tx1"/>
+                        </a:solidFill>
+                        <a:latin typeface="Consolas" panose="020B0609020204030204" charset="0"/>
+                        <a:cs typeface="Consolas" panose="020B0609020204030204" charset="0"/>
+                        <a:sym typeface="+mn-ea"/>
+                      </a:endParaRPr>
+                    </a:p>
+                  </a:txBody>
+                  <a:tcPr>
+                    <a:solidFill>
+                      <a:schemeClr val="accent6">
+                        <a:lumMod val="20000"/>
+                        <a:lumOff val="80000"/>
+                      </a:schemeClr>
+                    </a:solidFill>
+                  </a:tcPr>
+                </a:tc>
+              </a:tr>
+            </a:tbl>
+          </a:graphicData>
+        </a:graphic>
+      </p:graphicFrame>
+    </p:spTree>
+    <p:custDataLst>
+      <p:tags r:id="rId6"/>
+    </p:custDataLst>
+  </p:cSld>
+  <p:clrMapOvr>
+    <a:masterClrMapping/>
+  </p:clrMapOvr>
+</p:sld>
+</file>
+
+<file path=ppt/slides/slide26.xml><?xml version="1.0" encoding="utf-8"?>
+<p:sld xmlns:a="http://schemas.openxmlformats.org/drawingml/2006/main" xmlns:r="http://schemas.openxmlformats.org/officeDocument/2006/relationships" xmlns:p="http://schemas.openxmlformats.org/presentationml/2006/main">
+  <p:cSld>
+    <p:spTree>
+      <p:nvGrpSpPr>
+        <p:cNvPr id="1" name=""/>
+        <p:cNvGrpSpPr/>
+        <p:nvPr/>
+      </p:nvGrpSpPr>
+      <p:grpSpPr>
+        <a:xfrm>
+          <a:off x="0" y="0"/>
+          <a:ext cx="0" cy="0"/>
+          <a:chOff x="0" y="0"/>
+          <a:chExt cx="0" cy="0"/>
+        </a:xfrm>
+      </p:grpSpPr>
+      <p:sp>
+        <p:nvSpPr>
+          <p:cNvPr id="5" name="标题 4"/>
+          <p:cNvSpPr>
+            <a:spLocks noGrp="1"/>
+          </p:cNvSpPr>
+          <p:nvPr>
+            <p:ph type="title"/>
+            <p:custDataLst>
+              <p:tags r:id="rId1"/>
+            </p:custDataLst>
+          </p:nvPr>
+        </p:nvSpPr>
+        <p:spPr/>
+        <p:txBody>
+          <a:bodyPr>
+            <a:normAutofit fontScale="90000"/>
+          </a:bodyPr>
+          <a:lstStyle/>
+          <a:p>
+            <a:r>
+              <a:rPr lang="zh-CN" altLang="en-US"/>
+              <a:t>两点间距离</a:t>
+            </a:r>
+            <a:endParaRPr lang="zh-CN" altLang="en-US"/>
+          </a:p>
+        </p:txBody>
+      </p:sp>
+      <p:graphicFrame>
+        <p:nvGraphicFramePr>
+          <p:cNvPr id="3" name="表格 2"/>
+          <p:cNvGraphicFramePr/>
+          <p:nvPr>
+            <p:custDataLst>
+              <p:tags r:id="rId2"/>
+            </p:custDataLst>
+          </p:nvPr>
+        </p:nvGraphicFramePr>
+        <p:xfrm>
+          <a:off x="7473315" y="1209040"/>
+          <a:ext cx="3047365" cy="1463040"/>
+        </p:xfrm>
+        <a:graphic>
+          <a:graphicData uri="http://schemas.openxmlformats.org/drawingml/2006/table">
+            <a:tbl>
+              <a:tblPr firstRow="1" bandRow="1">
+                <a:tableStyleId>{5C22544A-7EE6-4342-B048-85BDC9FD1C3A}</a:tableStyleId>
+              </a:tblPr>
+              <a:tblGrid>
+                <a:gridCol w="3047365"/>
+              </a:tblGrid>
+              <a:tr h="1261745">
+                <a:tc>
+                  <a:txBody>
+                    <a:bodyPr/>
+                    <a:p>
+                      <a:pPr>
+                        <a:buNone/>
+                      </a:pPr>
+                      <a:r>
+                        <a:rPr lang="zh-CN" sz="1800" b="1">
+                          <a:solidFill>
+                            <a:schemeClr val="tx1"/>
+                          </a:solidFill>
+                          <a:latin typeface="Consolas" panose="020B0609020204030204" charset="0"/>
+                          <a:cs typeface="Consolas" panose="020B0609020204030204" charset="0"/>
+                          <a:sym typeface="+mn-ea"/>
+                        </a:rPr>
+                        <a:t>测试</a:t>
+                      </a:r>
+                      <a:r>
+                        <a:rPr lang="en-US" altLang="zh-CN" sz="1800" b="1">
+                          <a:solidFill>
+                            <a:schemeClr val="tx1"/>
+                          </a:solidFill>
+                          <a:latin typeface="Consolas" panose="020B0609020204030204" charset="0"/>
+                          <a:cs typeface="Consolas" panose="020B0609020204030204" charset="0"/>
+                          <a:sym typeface="+mn-ea"/>
+                        </a:rPr>
+                        <a:t>1</a:t>
+                      </a:r>
+                      <a:endParaRPr lang="en-US" altLang="zh-CN" sz="1800" b="1">
+                        <a:solidFill>
+                          <a:schemeClr val="tx1"/>
+                        </a:solidFill>
+                        <a:latin typeface="Consolas" panose="020B0609020204030204" charset="0"/>
+                        <a:cs typeface="Consolas" panose="020B0609020204030204" charset="0"/>
+                        <a:sym typeface="+mn-ea"/>
+                      </a:endParaRPr>
+                    </a:p>
+                    <a:p>
+                      <a:pPr>
+                        <a:buNone/>
+                      </a:pPr>
+                      <a:endParaRPr sz="1800" b="1">
+                        <a:solidFill>
+                          <a:schemeClr val="tx1"/>
+                        </a:solidFill>
+                        <a:latin typeface="Consolas" panose="020B0609020204030204" charset="0"/>
+                        <a:cs typeface="Consolas" panose="020B0609020204030204" charset="0"/>
+                        <a:sym typeface="+mn-ea"/>
+                      </a:endParaRPr>
+                    </a:p>
+                    <a:p>
+                      <a:pPr>
+                        <a:buNone/>
+                      </a:pPr>
+                      <a:r>
+                        <a:rPr sz="1800" b="0">
+                          <a:solidFill>
+                            <a:schemeClr val="tx1"/>
+                          </a:solidFill>
+                          <a:latin typeface="Consolas" panose="020B0609020204030204" charset="0"/>
+                          <a:cs typeface="Consolas" panose="020B0609020204030204" charset="0"/>
+                          <a:sym typeface="+mn-ea"/>
+                        </a:rPr>
+                        <a:t>Enter point 1: 0 0</a:t>
+                      </a:r>
+                      <a:endParaRPr sz="1800" b="0">
+                        <a:solidFill>
+                          <a:schemeClr val="tx1"/>
+                        </a:solidFill>
+                        <a:latin typeface="Consolas" panose="020B0609020204030204" charset="0"/>
+                        <a:cs typeface="Consolas" panose="020B0609020204030204" charset="0"/>
+                        <a:sym typeface="+mn-ea"/>
+                      </a:endParaRPr>
+                    </a:p>
+                    <a:p>
+                      <a:pPr>
+                        <a:buNone/>
+                      </a:pPr>
+                      <a:r>
+                        <a:rPr sz="1800" b="0">
+                          <a:solidFill>
+                            <a:schemeClr val="tx1"/>
+                          </a:solidFill>
+                          <a:latin typeface="Consolas" panose="020B0609020204030204" charset="0"/>
+                          <a:cs typeface="Consolas" panose="020B0609020204030204" charset="0"/>
+                          <a:sym typeface="+mn-ea"/>
+                        </a:rPr>
+                        <a:t>Enter point 2: 3 4</a:t>
+                      </a:r>
+                      <a:endParaRPr sz="1800" b="0">
+                        <a:solidFill>
+                          <a:schemeClr val="tx1"/>
+                        </a:solidFill>
+                        <a:latin typeface="Consolas" panose="020B0609020204030204" charset="0"/>
+                        <a:cs typeface="Consolas" panose="020B0609020204030204" charset="0"/>
+                        <a:sym typeface="+mn-ea"/>
+                      </a:endParaRPr>
+                    </a:p>
+                    <a:p>
+                      <a:pPr>
+                        <a:buNone/>
+                      </a:pPr>
+                      <a:r>
+                        <a:rPr sz="1800" b="0">
+                          <a:solidFill>
+                            <a:schemeClr val="tx1"/>
+                          </a:solidFill>
+                          <a:latin typeface="Consolas" panose="020B0609020204030204" charset="0"/>
+                          <a:cs typeface="Consolas" panose="020B0609020204030204" charset="0"/>
+                          <a:sym typeface="+mn-ea"/>
+                        </a:rPr>
+                        <a:t>Distance = 5.00</a:t>
+                      </a:r>
+                      <a:endParaRPr sz="1800" b="0">
+                        <a:solidFill>
+                          <a:schemeClr val="tx1"/>
+                        </a:solidFill>
+                        <a:latin typeface="Consolas" panose="020B0609020204030204" charset="0"/>
+                        <a:cs typeface="Consolas" panose="020B0609020204030204" charset="0"/>
+                        <a:sym typeface="+mn-ea"/>
+                      </a:endParaRPr>
+                    </a:p>
+                  </a:txBody>
+                  <a:tcPr>
+                    <a:solidFill>
+                      <a:schemeClr val="accent6">
+                        <a:lumMod val="20000"/>
+                        <a:lumOff val="80000"/>
+                      </a:schemeClr>
+                    </a:solidFill>
+                  </a:tcPr>
+                </a:tc>
+              </a:tr>
+            </a:tbl>
+          </a:graphicData>
+        </a:graphic>
+      </p:graphicFrame>
+      <mc:AlternateContent xmlns:mc="http://schemas.openxmlformats.org/markup-compatibility/2006">
+        <mc:Choice xmlns:a14="http://schemas.microsoft.com/office/drawing/2010/main" Requires="a14">
+          <p:sp>
+            <p:nvSpPr>
+              <p:cNvPr id="2" name="文本占位符 5"/>
+              <p:cNvSpPr>
+                <a:spLocks noGrp="1"/>
+              </p:cNvSpPr>
+              <p:nvPr>
+                <p:custDataLst>
+                  <p:tags r:id="rId3"/>
+                </p:custDataLst>
+              </p:nvPr>
+            </p:nvSpPr>
+            <p:spPr>
+              <a:xfrm>
+                <a:off x="1082675" y="1209040"/>
+                <a:ext cx="4139565" cy="1163320"/>
+              </a:xfrm>
+              <a:prstGeom prst="rect">
+                <a:avLst/>
+              </a:prstGeom>
+            </p:spPr>
+            <p:txBody>
+              <a:bodyPr vert="horz" lIns="90000" tIns="46800" rIns="90000" bIns="46800" rtlCol="0">
+                <a:noAutofit/>
+              </a:bodyPr>
+              <a:lstStyle>
+                <a:lvl1pPr marL="0" indent="0" algn="l" defTabSz="914400" rtl="0" eaLnBrk="1" fontAlgn="auto" latinLnBrk="0" hangingPunct="1">
+                  <a:lnSpc>
+                    <a:spcPct val="130000"/>
+                  </a:lnSpc>
+                  <a:spcBef>
+                    <a:spcPts val="0"/>
+                  </a:spcBef>
+                  <a:spcAft>
+                    <a:spcPts val="1000"/>
+                  </a:spcAft>
+                  <a:buFont typeface="Arial" panose="020B0604020202020204" pitchFamily="34" charset="0"/>
+                  <a:buNone/>
+                  <a:defRPr sz="1600" u="none" strike="noStrike" kern="1200" cap="none" spc="150" normalizeH="0" baseline="0">
+                    <a:solidFill>
+                      <a:schemeClr val="tx1">
+                        <a:lumMod val="85000"/>
+                        <a:lumOff val="15000"/>
+                      </a:schemeClr>
+                    </a:solidFill>
+                    <a:uFillTx/>
+                    <a:latin typeface="Arial" panose="020B0604020202020204" pitchFamily="34" charset="0"/>
+                    <a:ea typeface="微软雅黑" panose="020B0503020204020204" charset="-122"/>
+                    <a:cs typeface="+mn-cs"/>
+                  </a:defRPr>
+                </a:lvl1pPr>
+                <a:lvl2pPr marL="685800" indent="-228600" algn="l" defTabSz="914400" rtl="0" eaLnBrk="1" fontAlgn="auto" latinLnBrk="0" hangingPunct="1">
+                  <a:lnSpc>
+                    <a:spcPct val="130000"/>
+                  </a:lnSpc>
+                  <a:spcBef>
+                    <a:spcPts val="0"/>
+                  </a:spcBef>
+                  <a:spcAft>
+                    <a:spcPts val="1000"/>
+                  </a:spcAft>
+                  <a:buFont typeface="Arial" panose="020B0604020202020204" pitchFamily="34" charset="0"/>
+                  <a:buChar char="•"/>
+                  <a:tabLst>
+                    <a:tab pos="1609725" algn="l"/>
+                  </a:tabLst>
+                  <a:defRPr sz="1600" u="none" strike="noStrike" kern="1200" cap="none" spc="150" normalizeH="0" baseline="0">
+                    <a:solidFill>
+                      <a:schemeClr val="tx1">
+                        <a:lumMod val="85000"/>
+                        <a:lumOff val="15000"/>
+                      </a:schemeClr>
+                    </a:solidFill>
+                    <a:uFillTx/>
+                    <a:latin typeface="Arial" panose="020B0604020202020204" pitchFamily="34" charset="0"/>
+                    <a:ea typeface="微软雅黑" panose="020B0503020204020204" charset="-122"/>
+                    <a:cs typeface="+mn-cs"/>
+                  </a:defRPr>
+                </a:lvl2pPr>
+                <a:lvl3pPr marL="1143000" indent="-228600" algn="l" defTabSz="914400" rtl="0" eaLnBrk="1" fontAlgn="auto" latinLnBrk="0" hangingPunct="1">
+                  <a:lnSpc>
+                    <a:spcPct val="130000"/>
+                  </a:lnSpc>
+                  <a:spcBef>
+                    <a:spcPts val="0"/>
+                  </a:spcBef>
+                  <a:spcAft>
+                    <a:spcPts val="1000"/>
+                  </a:spcAft>
+                  <a:buFont typeface="Arial" panose="020B0604020202020204" pitchFamily="34" charset="0"/>
+                  <a:buChar char="•"/>
+                  <a:defRPr sz="1600" u="none" strike="noStrike" kern="1200" cap="none" spc="150" normalizeH="0" baseline="0">
+                    <a:solidFill>
+                      <a:schemeClr val="tx1">
+                        <a:lumMod val="85000"/>
+                        <a:lumOff val="15000"/>
+                      </a:schemeClr>
+                    </a:solidFill>
+                    <a:uFillTx/>
+                    <a:latin typeface="Arial" panose="020B0604020202020204" pitchFamily="34" charset="0"/>
+                    <a:ea typeface="微软雅黑" panose="020B0503020204020204" charset="-122"/>
+                    <a:cs typeface="+mn-cs"/>
+                  </a:defRPr>
+                </a:lvl3pPr>
+                <a:lvl4pPr marL="1600200" indent="-228600" algn="l" defTabSz="914400" rtl="0" eaLnBrk="1" fontAlgn="auto" latinLnBrk="0" hangingPunct="1">
+                  <a:lnSpc>
+                    <a:spcPct val="130000"/>
+                  </a:lnSpc>
+                  <a:spcBef>
+                    <a:spcPts val="0"/>
+                  </a:spcBef>
+                  <a:spcAft>
+                    <a:spcPts val="1000"/>
+                  </a:spcAft>
+                  <a:buFont typeface="Arial" panose="020B0604020202020204" pitchFamily="34" charset="0"/>
+                  <a:buChar char="•"/>
+                  <a:defRPr sz="1600" u="none" strike="noStrike" kern="1200" cap="none" spc="150" normalizeH="0" baseline="0">
+                    <a:solidFill>
+                      <a:schemeClr val="tx1">
+                        <a:lumMod val="85000"/>
+                        <a:lumOff val="15000"/>
+                      </a:schemeClr>
+                    </a:solidFill>
+                    <a:uFillTx/>
+                    <a:latin typeface="Arial" panose="020B0604020202020204" pitchFamily="34" charset="0"/>
+                    <a:ea typeface="微软雅黑" panose="020B0503020204020204" charset="-122"/>
+                    <a:cs typeface="+mn-cs"/>
+                  </a:defRPr>
+                </a:lvl4pPr>
+                <a:lvl5pPr marL="2057400" indent="-228600" algn="l" defTabSz="914400" rtl="0" eaLnBrk="1" fontAlgn="auto" latinLnBrk="0" hangingPunct="1">
+                  <a:lnSpc>
+                    <a:spcPct val="130000"/>
+                  </a:lnSpc>
+                  <a:spcBef>
+                    <a:spcPts val="0"/>
+                  </a:spcBef>
+                  <a:spcAft>
+                    <a:spcPts val="1000"/>
+                  </a:spcAft>
+                  <a:buFont typeface="Arial" panose="020B0604020202020204" pitchFamily="34" charset="0"/>
+                  <a:buChar char="•"/>
+                  <a:defRPr sz="1600" u="none" strike="noStrike" kern="1200" cap="none" spc="150" normalizeH="0" baseline="0">
+                    <a:solidFill>
+                      <a:schemeClr val="tx1">
+                        <a:lumMod val="85000"/>
+                        <a:lumOff val="15000"/>
+                      </a:schemeClr>
+                    </a:solidFill>
+                    <a:uFillTx/>
+                    <a:latin typeface="Arial" panose="020B0604020202020204" pitchFamily="34" charset="0"/>
+                    <a:ea typeface="微软雅黑" panose="020B0503020204020204" charset="-122"/>
+                    <a:cs typeface="+mn-cs"/>
+                  </a:defRPr>
+                </a:lvl5pPr>
+                <a:lvl6pPr marL="2514600" indent="-228600" algn="l" defTabSz="914400" rtl="0" eaLnBrk="1" latinLnBrk="0" hangingPunct="1">
+                  <a:lnSpc>
+                    <a:spcPct val="90000"/>
+                  </a:lnSpc>
+                  <a:spcBef>
+                    <a:spcPts val="500"/>
+                  </a:spcBef>
+                  <a:buFont typeface="Arial" panose="020B0604020202020204" pitchFamily="34" charset="0"/>
+                  <a:buChar char="•"/>
+                  <a:defRPr sz="1800" kern="1200">
+                    <a:solidFill>
+                      <a:schemeClr val="tx1"/>
+                    </a:solidFill>
+                    <a:latin typeface="+mn-lt"/>
+                    <a:ea typeface="+mn-ea"/>
+                    <a:cs typeface="+mn-cs"/>
+                  </a:defRPr>
+                </a:lvl6pPr>
+                <a:lvl7pPr marL="2971800" indent="-228600" algn="l" defTabSz="914400" rtl="0" eaLnBrk="1" latinLnBrk="0" hangingPunct="1">
+                  <a:lnSpc>
+                    <a:spcPct val="90000"/>
+                  </a:lnSpc>
+                  <a:spcBef>
+                    <a:spcPts val="500"/>
+                  </a:spcBef>
+                  <a:buFont typeface="Arial" panose="020B0604020202020204" pitchFamily="34" charset="0"/>
+                  <a:buChar char="•"/>
+                  <a:defRPr sz="1800" kern="1200">
+                    <a:solidFill>
+                      <a:schemeClr val="tx1"/>
+                    </a:solidFill>
+                    <a:latin typeface="+mn-lt"/>
+                    <a:ea typeface="+mn-ea"/>
+                    <a:cs typeface="+mn-cs"/>
+                  </a:defRPr>
+                </a:lvl7pPr>
+                <a:lvl8pPr marL="3429000" indent="-228600" algn="l" defTabSz="914400" rtl="0" eaLnBrk="1" latinLnBrk="0" hangingPunct="1">
+                  <a:lnSpc>
+                    <a:spcPct val="90000"/>
+                  </a:lnSpc>
+                  <a:spcBef>
+                    <a:spcPts val="500"/>
+                  </a:spcBef>
+                  <a:buFont typeface="Arial" panose="020B0604020202020204" pitchFamily="34" charset="0"/>
+                  <a:buChar char="•"/>
+                  <a:defRPr sz="1800" kern="1200">
+                    <a:solidFill>
+                      <a:schemeClr val="tx1"/>
+                    </a:solidFill>
+                    <a:latin typeface="+mn-lt"/>
+                    <a:ea typeface="+mn-ea"/>
+                    <a:cs typeface="+mn-cs"/>
+                  </a:defRPr>
+                </a:lvl8pPr>
+                <a:lvl9pPr marL="3886200" indent="-228600" algn="l" defTabSz="914400" rtl="0" eaLnBrk="1" latinLnBrk="0" hangingPunct="1">
+                  <a:lnSpc>
+                    <a:spcPct val="90000"/>
+                  </a:lnSpc>
+                  <a:spcBef>
+                    <a:spcPts val="500"/>
+                  </a:spcBef>
+                  <a:buFont typeface="Arial" panose="020B0604020202020204" pitchFamily="34" charset="0"/>
+                  <a:buChar char="•"/>
+                  <a:defRPr sz="1800" kern="1200">
+                    <a:solidFill>
+                      <a:schemeClr val="tx1"/>
+                    </a:solidFill>
+                    <a:latin typeface="+mn-lt"/>
+                    <a:ea typeface="+mn-ea"/>
+                    <a:cs typeface="+mn-cs"/>
+                  </a:defRPr>
+                </a:lvl9pPr>
+              </a:lstStyle>
+              <a:p>
+                <a:r>
+                  <a:rPr lang="zh-CN">
+                    <a:latin typeface="+mn-lt"/>
+                    <a:cs typeface="+mn-lt"/>
+                  </a:rPr>
+                  <a:t>输入两个点的坐标，计算两点间的距离。</a:t>
+                </a:r>
+                <a:endParaRPr lang="zh-CN">
+                  <a:latin typeface="+mn-lt"/>
+                  <a:cs typeface="+mn-lt"/>
+                </a:endParaRPr>
+              </a:p>
+              <a:p>
+                <a14:m>
+                  <m:oMathPara xmlns:m="http://schemas.openxmlformats.org/officeDocument/2006/math">
+                    <m:oMathParaPr>
+                      <m:jc m:val="centerGroup"/>
+                    </m:oMathParaPr>
+                    <m:oMath xmlns:m="http://schemas.openxmlformats.org/officeDocument/2006/math">
+                      <m:r>
+                        <a:rPr lang="en-US" i="1">
+                          <a:latin typeface="Cambria Math" panose="02040503050406030204" charset="0"/>
+                          <a:cs typeface="Cambria Math" panose="02040503050406030204" charset="0"/>
+                        </a:rPr>
+                        <m:t>𝑑𝑖𝑠𝑡𝑎𝑛𝑐𝑒</m:t>
+                      </m:r>
+                      <m:r>
+                        <a:rPr lang="en-US" i="1">
+                          <a:latin typeface="Cambria Math" panose="02040503050406030204" charset="0"/>
+                          <a:cs typeface="Cambria Math" panose="02040503050406030204" charset="0"/>
+                        </a:rPr>
+                        <m:t>=</m:t>
+                      </m:r>
+                      <m:rad>
+                        <m:radPr>
+                          <m:degHide m:val="on"/>
+                          <m:ctrlPr>
+                            <a:rPr lang="en-US" i="1">
+                              <a:latin typeface="Cambria Math" panose="02040503050406030204" charset="0"/>
+                              <a:cs typeface="Cambria Math" panose="02040503050406030204" charset="0"/>
+                            </a:rPr>
+                          </m:ctrlPr>
+                        </m:radPr>
+                        <m:deg/>
+                        <m:e>
+                          <m:sSup>
+                            <m:sSupPr>
+                              <m:ctrlPr>
+                                <a:rPr lang="en-US" i="1">
+                                  <a:latin typeface="Cambria Math" panose="02040503050406030204" charset="0"/>
+                                  <a:cs typeface="Cambria Math" panose="02040503050406030204" charset="0"/>
+                                </a:rPr>
+                              </m:ctrlPr>
+                            </m:sSupPr>
+                            <m:e>
+                              <m:r>
+                                <a:rPr lang="en-US" i="1">
+                                  <a:latin typeface="Cambria Math" panose="02040503050406030204" charset="0"/>
+                                  <a:cs typeface="Cambria Math" panose="02040503050406030204" charset="0"/>
+                                </a:rPr>
+                                <m:t>(</m:t>
+                              </m:r>
+                              <m:sSub>
+                                <m:sSubPr>
+                                  <m:ctrlPr>
+                                    <a:rPr lang="en-US" i="1">
+                                      <a:latin typeface="Cambria Math" panose="02040503050406030204" charset="0"/>
+                                      <a:cs typeface="Cambria Math" panose="02040503050406030204" charset="0"/>
+                                    </a:rPr>
+                                  </m:ctrlPr>
+                                </m:sSubPr>
+                                <m:e>
+                                  <m:r>
+                                    <a:rPr lang="en-US" i="1">
+                                      <a:latin typeface="Cambria Math" panose="02040503050406030204" charset="0"/>
+                                      <a:cs typeface="Cambria Math" panose="02040503050406030204" charset="0"/>
+                                    </a:rPr>
+                                    <m:t>𝑥</m:t>
+                                  </m:r>
+                                </m:e>
+                                <m:sub>
+                                  <m:r>
+                                    <a:rPr lang="en-US" i="1">
+                                      <a:latin typeface="Cambria Math" panose="02040503050406030204" charset="0"/>
+                                      <a:cs typeface="Cambria Math" panose="02040503050406030204" charset="0"/>
+                                    </a:rPr>
+                                    <m:t>1</m:t>
+                                  </m:r>
+                                </m:sub>
+                              </m:sSub>
+                              <m:r>
+                                <a:rPr lang="en-US" i="1">
+                                  <a:latin typeface="Cambria Math" panose="02040503050406030204" charset="0"/>
+                                  <a:cs typeface="Cambria Math" panose="02040503050406030204" charset="0"/>
+                                </a:rPr>
+                                <m:t>−</m:t>
+                              </m:r>
+                              <m:sSub>
+                                <m:sSubPr>
+                                  <m:ctrlPr>
+                                    <a:rPr lang="en-US" i="1">
+                                      <a:latin typeface="Cambria Math" panose="02040503050406030204" charset="0"/>
+                                      <a:cs typeface="Cambria Math" panose="02040503050406030204" charset="0"/>
+                                    </a:rPr>
+                                  </m:ctrlPr>
+                                </m:sSubPr>
+                                <m:e>
+                                  <m:r>
+                                    <a:rPr lang="en-US" i="1">
+                                      <a:latin typeface="Cambria Math" panose="02040503050406030204" charset="0"/>
+                                      <a:cs typeface="Cambria Math" panose="02040503050406030204" charset="0"/>
+                                    </a:rPr>
+                                    <m:t>𝑥</m:t>
+                                  </m:r>
+                                </m:e>
+                                <m:sub>
+                                  <m:r>
+                                    <a:rPr lang="en-US" i="1">
+                                      <a:latin typeface="Cambria Math" panose="02040503050406030204" charset="0"/>
+                                      <a:cs typeface="Cambria Math" panose="02040503050406030204" charset="0"/>
+                                    </a:rPr>
+                                    <m:t>2</m:t>
+                                  </m:r>
+                                </m:sub>
+                              </m:sSub>
+                              <m:r>
+                                <a:rPr lang="en-US" i="1">
+                                  <a:latin typeface="Cambria Math" panose="02040503050406030204" charset="0"/>
+                                  <a:cs typeface="Cambria Math" panose="02040503050406030204" charset="0"/>
+                                </a:rPr>
+                                <m:t>)</m:t>
+                              </m:r>
+                            </m:e>
+                            <m:sup>
+                              <m:r>
+                                <a:rPr lang="en-US" i="1">
+                                  <a:latin typeface="Cambria Math" panose="02040503050406030204" charset="0"/>
+                                  <a:cs typeface="Cambria Math" panose="02040503050406030204" charset="0"/>
+                                </a:rPr>
+                                <m:t>2</m:t>
+                              </m:r>
+                            </m:sup>
+                          </m:sSup>
+                          <m:r>
+                            <a:rPr lang="en-US" i="1">
+                              <a:latin typeface="Cambria Math" panose="02040503050406030204" charset="0"/>
+                              <a:cs typeface="Cambria Math" panose="02040503050406030204" charset="0"/>
+                            </a:rPr>
+                            <m:t>−</m:t>
+                          </m:r>
+                          <m:sSup>
+                            <m:sSupPr>
+                              <m:ctrlPr>
+                                <a:rPr lang="en-US" i="1">
+                                  <a:latin typeface="Cambria Math" panose="02040503050406030204" charset="0"/>
+                                  <a:cs typeface="Cambria Math" panose="02040503050406030204" charset="0"/>
+                                </a:rPr>
+                              </m:ctrlPr>
+                            </m:sSupPr>
+                            <m:e>
+                              <m:r>
+                                <a:rPr lang="en-US" i="1">
+                                  <a:latin typeface="Cambria Math" panose="02040503050406030204" charset="0"/>
+                                  <a:cs typeface="Cambria Math" panose="02040503050406030204" charset="0"/>
+                                </a:rPr>
+                                <m:t>(</m:t>
+                              </m:r>
+                              <m:sSub>
+                                <m:sSubPr>
+                                  <m:ctrlPr>
+                                    <a:rPr lang="en-US" i="1">
+                                      <a:latin typeface="Cambria Math" panose="02040503050406030204" charset="0"/>
+                                      <a:cs typeface="Cambria Math" panose="02040503050406030204" charset="0"/>
+                                    </a:rPr>
+                                  </m:ctrlPr>
+                                </m:sSubPr>
+                                <m:e>
+                                  <m:r>
+                                    <a:rPr lang="en-US" i="1">
+                                      <a:latin typeface="Cambria Math" panose="02040503050406030204" charset="0"/>
+                                      <a:cs typeface="Cambria Math" panose="02040503050406030204" charset="0"/>
+                                    </a:rPr>
+                                    <m:t>𝑦</m:t>
+                                  </m:r>
+                                </m:e>
+                                <m:sub>
+                                  <m:r>
+                                    <a:rPr lang="en-US" i="1">
+                                      <a:latin typeface="Cambria Math" panose="02040503050406030204" charset="0"/>
+                                      <a:cs typeface="Cambria Math" panose="02040503050406030204" charset="0"/>
+                                    </a:rPr>
+                                    <m:t>1</m:t>
+                                  </m:r>
+                                </m:sub>
+                              </m:sSub>
+                              <m:r>
+                                <a:rPr lang="en-US" i="1">
+                                  <a:latin typeface="Cambria Math" panose="02040503050406030204" charset="0"/>
+                                  <a:cs typeface="Cambria Math" panose="02040503050406030204" charset="0"/>
+                                </a:rPr>
+                                <m:t>−</m:t>
+                              </m:r>
+                              <m:sSub>
+                                <m:sSubPr>
+                                  <m:ctrlPr>
+                                    <a:rPr lang="en-US" i="1">
+                                      <a:latin typeface="Cambria Math" panose="02040503050406030204" charset="0"/>
+                                      <a:cs typeface="Cambria Math" panose="02040503050406030204" charset="0"/>
+                                    </a:rPr>
+                                  </m:ctrlPr>
+                                </m:sSubPr>
+                                <m:e>
+                                  <m:r>
+                                    <a:rPr lang="en-US" i="1">
+                                      <a:latin typeface="Cambria Math" panose="02040503050406030204" charset="0"/>
+                                      <a:cs typeface="Cambria Math" panose="02040503050406030204" charset="0"/>
+                                    </a:rPr>
+                                    <m:t>𝑦</m:t>
+                                  </m:r>
+                                </m:e>
+                                <m:sub>
+                                  <m:r>
+                                    <a:rPr lang="en-US" i="1">
+                                      <a:latin typeface="Cambria Math" panose="02040503050406030204" charset="0"/>
+                                      <a:cs typeface="Cambria Math" panose="02040503050406030204" charset="0"/>
+                                    </a:rPr>
+                                    <m:t>2</m:t>
+                                  </m:r>
+                                </m:sub>
+                              </m:sSub>
+                              <m:r>
+                                <a:rPr lang="en-US" i="1">
+                                  <a:latin typeface="Cambria Math" panose="02040503050406030204" charset="0"/>
+                                  <a:cs typeface="Cambria Math" panose="02040503050406030204" charset="0"/>
+                                </a:rPr>
+                                <m:t>)</m:t>
+                              </m:r>
+                            </m:e>
+                            <m:sup>
+                              <m:r>
+                                <a:rPr lang="en-US" i="1">
+                                  <a:latin typeface="Cambria Math" panose="02040503050406030204" charset="0"/>
+                                  <a:cs typeface="Cambria Math" panose="02040503050406030204" charset="0"/>
+                                </a:rPr>
+                                <m:t>2</m:t>
+                              </m:r>
+                            </m:sup>
+                          </m:sSup>
+                        </m:e>
+                      </m:rad>
+                    </m:oMath>
+                  </m:oMathPara>
+                </a14:m>
+                <a:endParaRPr>
+                  <a:latin typeface="+mn-lt"/>
+                  <a:cs typeface="+mn-lt"/>
+                </a:endParaRPr>
+              </a:p>
+            </p:txBody>
+          </p:sp>
+        </mc:Choice>
+        <mc:Fallback>
+          <p:sp>
+            <p:nvSpPr>
+              <p:cNvPr id="2" name="文本占位符 5"/>
+              <p:cNvSpPr>
+                <a:spLocks noRot="1" noChangeAspect="1" noMove="1" noResize="1" noEditPoints="1" noAdjustHandles="1" noChangeArrowheads="1" noChangeShapeType="1" noTextEdit="1"/>
+              </p:cNvSpPr>
+              <p:nvPr>
+                <p:custDataLst>
+                  <p:tags r:id="rId4"/>
+                </p:custDataLst>
+              </p:nvPr>
+            </p:nvSpPr>
+            <p:spPr>
+              <a:xfrm>
+                <a:off x="1082675" y="1209040"/>
+                <a:ext cx="4139565" cy="1163320"/>
+              </a:xfrm>
+              <a:prstGeom prst="rect">
+                <a:avLst/>
+              </a:prstGeom>
+              <a:blipFill rotWithShape="1">
+                <a:blip r:embed="rId5"/>
+                <a:stretch>
+                  <a:fillRect/>
+                </a:stretch>
+              </a:blipFill>
+            </p:spPr>
+            <p:txBody>
+              <a:bodyPr/>
+              <a:lstStyle/>
+              <a:p>
+                <a:r>
+                  <a:rPr lang="zh-CN" altLang="en-US">
+                    <a:noFill/>
+                  </a:rPr>
+                  <a:t> </a:t>
+                </a:r>
+              </a:p>
+            </p:txBody>
+          </p:sp>
+        </mc:Fallback>
+      </mc:AlternateContent>
+      <p:graphicFrame>
+        <p:nvGraphicFramePr>
+          <p:cNvPr id="4" name="表格 3"/>
+          <p:cNvGraphicFramePr/>
+          <p:nvPr>
+            <p:custDataLst>
+              <p:tags r:id="rId6"/>
+            </p:custDataLst>
+          </p:nvPr>
+        </p:nvGraphicFramePr>
+        <p:xfrm>
+          <a:off x="7473315" y="3039110"/>
+          <a:ext cx="3047365" cy="1463040"/>
+        </p:xfrm>
+        <a:graphic>
+          <a:graphicData uri="http://schemas.openxmlformats.org/drawingml/2006/table">
+            <a:tbl>
+              <a:tblPr firstRow="1" bandRow="1">
+                <a:tableStyleId>{5C22544A-7EE6-4342-B048-85BDC9FD1C3A}</a:tableStyleId>
+              </a:tblPr>
+              <a:tblGrid>
+                <a:gridCol w="3047365"/>
+              </a:tblGrid>
+              <a:tr h="1463040">
+                <a:tc>
+                  <a:txBody>
+                    <a:bodyPr/>
+                    <a:p>
+                      <a:pPr>
+                        <a:buNone/>
+                      </a:pPr>
+                      <a:r>
+                        <a:rPr lang="zh-CN" sz="1800" b="1">
+                          <a:solidFill>
+                            <a:schemeClr val="tx1"/>
+                          </a:solidFill>
+                          <a:latin typeface="Consolas" panose="020B0609020204030204" charset="0"/>
+                          <a:cs typeface="Consolas" panose="020B0609020204030204" charset="0"/>
+                          <a:sym typeface="+mn-ea"/>
+                        </a:rPr>
+                        <a:t>测试</a:t>
+                      </a:r>
+                      <a:r>
+                        <a:rPr lang="en-US" altLang="zh-CN" sz="1800" b="1">
+                          <a:solidFill>
+                            <a:schemeClr val="tx1"/>
+                          </a:solidFill>
+                          <a:latin typeface="Consolas" panose="020B0609020204030204" charset="0"/>
+                          <a:cs typeface="Consolas" panose="020B0609020204030204" charset="0"/>
+                          <a:sym typeface="+mn-ea"/>
+                        </a:rPr>
+                        <a:t>2</a:t>
+                      </a:r>
+                      <a:endParaRPr lang="en-US" altLang="zh-CN" sz="1800" b="1">
+                        <a:solidFill>
+                          <a:schemeClr val="tx1"/>
+                        </a:solidFill>
+                        <a:latin typeface="Consolas" panose="020B0609020204030204" charset="0"/>
+                        <a:cs typeface="Consolas" panose="020B0609020204030204" charset="0"/>
+                        <a:sym typeface="+mn-ea"/>
+                      </a:endParaRPr>
+                    </a:p>
+                    <a:p>
+                      <a:pPr>
+                        <a:buNone/>
+                      </a:pPr>
+                      <a:endParaRPr sz="1800" b="1">
+                        <a:solidFill>
+                          <a:schemeClr val="tx1"/>
+                        </a:solidFill>
+                        <a:latin typeface="Consolas" panose="020B0609020204030204" charset="0"/>
+                        <a:cs typeface="Consolas" panose="020B0609020204030204" charset="0"/>
+                        <a:sym typeface="+mn-ea"/>
+                      </a:endParaRPr>
+                    </a:p>
+                    <a:p>
+                      <a:pPr>
+                        <a:buNone/>
+                      </a:pPr>
+                      <a:r>
+                        <a:rPr sz="1800" b="0">
+                          <a:solidFill>
+                            <a:schemeClr val="tx1"/>
+                          </a:solidFill>
+                          <a:latin typeface="Consolas" panose="020B0609020204030204" charset="0"/>
+                          <a:cs typeface="Consolas" panose="020B0609020204030204" charset="0"/>
+                          <a:sym typeface="+mn-ea"/>
+                        </a:rPr>
+                        <a:t>Enter point 1: 3 5</a:t>
+                      </a:r>
+                      <a:endParaRPr sz="1800" b="0">
+                        <a:solidFill>
+                          <a:schemeClr val="tx1"/>
+                        </a:solidFill>
+                        <a:latin typeface="Consolas" panose="020B0609020204030204" charset="0"/>
+                        <a:cs typeface="Consolas" panose="020B0609020204030204" charset="0"/>
+                        <a:sym typeface="+mn-ea"/>
+                      </a:endParaRPr>
+                    </a:p>
+                    <a:p>
+                      <a:pPr>
+                        <a:buNone/>
+                      </a:pPr>
+                      <a:r>
+                        <a:rPr sz="1800" b="0">
+                          <a:solidFill>
+                            <a:schemeClr val="tx1"/>
+                          </a:solidFill>
+                          <a:latin typeface="Consolas" panose="020B0609020204030204" charset="0"/>
+                          <a:cs typeface="Consolas" panose="020B0609020204030204" charset="0"/>
+                          <a:sym typeface="+mn-ea"/>
+                        </a:rPr>
+                        <a:t>Enter point 2: 4 8</a:t>
+                      </a:r>
+                      <a:endParaRPr sz="1800" b="0">
+                        <a:solidFill>
+                          <a:schemeClr val="tx1"/>
+                        </a:solidFill>
+                        <a:latin typeface="Consolas" panose="020B0609020204030204" charset="0"/>
+                        <a:cs typeface="Consolas" panose="020B0609020204030204" charset="0"/>
+                        <a:sym typeface="+mn-ea"/>
+                      </a:endParaRPr>
+                    </a:p>
+                    <a:p>
+                      <a:pPr>
+                        <a:buNone/>
+                      </a:pPr>
+                      <a:r>
+                        <a:rPr sz="1800" b="0">
+                          <a:solidFill>
+                            <a:schemeClr val="tx1"/>
+                          </a:solidFill>
+                          <a:latin typeface="Consolas" panose="020B0609020204030204" charset="0"/>
+                          <a:cs typeface="Consolas" panose="020B0609020204030204" charset="0"/>
+                          <a:sym typeface="+mn-ea"/>
+                        </a:rPr>
+                        <a:t>Distance = 3.16</a:t>
+                      </a:r>
+                      <a:endParaRPr sz="1800" b="0">
+                        <a:solidFill>
+                          <a:schemeClr val="tx1"/>
+                        </a:solidFill>
+                        <a:latin typeface="Consolas" panose="020B0609020204030204" charset="0"/>
+                        <a:cs typeface="Consolas" panose="020B0609020204030204" charset="0"/>
+                        <a:sym typeface="+mn-ea"/>
+                      </a:endParaRPr>
+                    </a:p>
+                  </a:txBody>
+                  <a:tcPr>
+                    <a:solidFill>
+                      <a:schemeClr val="accent6">
+                        <a:lumMod val="20000"/>
+                        <a:lumOff val="80000"/>
+                      </a:schemeClr>
+                    </a:solidFill>
+                  </a:tcPr>
+                </a:tc>
+              </a:tr>
+            </a:tbl>
+          </a:graphicData>
+        </a:graphic>
+      </p:graphicFrame>
+      <p:graphicFrame>
+        <p:nvGraphicFramePr>
+          <p:cNvPr id="6" name="表格 5"/>
+          <p:cNvGraphicFramePr/>
+          <p:nvPr>
+            <p:custDataLst>
+              <p:tags r:id="rId7"/>
+            </p:custDataLst>
+          </p:nvPr>
+        </p:nvGraphicFramePr>
+        <p:xfrm>
+          <a:off x="7473315" y="4869180"/>
+          <a:ext cx="3047365" cy="1463040"/>
+        </p:xfrm>
+        <a:graphic>
+          <a:graphicData uri="http://schemas.openxmlformats.org/drawingml/2006/table">
+            <a:tbl>
+              <a:tblPr firstRow="1" bandRow="1">
+                <a:tableStyleId>{5C22544A-7EE6-4342-B048-85BDC9FD1C3A}</a:tableStyleId>
+              </a:tblPr>
+              <a:tblGrid>
+                <a:gridCol w="3047365"/>
+              </a:tblGrid>
+              <a:tr h="1463040">
+                <a:tc>
+                  <a:txBody>
+                    <a:bodyPr/>
+                    <a:p>
+                      <a:pPr>
+                        <a:buNone/>
+                      </a:pPr>
+                      <a:r>
+                        <a:rPr lang="zh-CN" sz="1800" b="1">
+                          <a:solidFill>
+                            <a:schemeClr val="tx1"/>
+                          </a:solidFill>
+                          <a:latin typeface="Consolas" panose="020B0609020204030204" charset="0"/>
+                          <a:cs typeface="Consolas" panose="020B0609020204030204" charset="0"/>
+                          <a:sym typeface="+mn-ea"/>
+                        </a:rPr>
+                        <a:t>测试</a:t>
+                      </a:r>
+                      <a:r>
+                        <a:rPr lang="en-US" altLang="zh-CN" sz="1800" b="1">
+                          <a:solidFill>
+                            <a:schemeClr val="tx1"/>
+                          </a:solidFill>
+                          <a:latin typeface="Consolas" panose="020B0609020204030204" charset="0"/>
+                          <a:cs typeface="Consolas" panose="020B0609020204030204" charset="0"/>
+                          <a:sym typeface="+mn-ea"/>
+                        </a:rPr>
+                        <a:t>3</a:t>
+                      </a:r>
+                      <a:endParaRPr lang="en-US" altLang="zh-CN" sz="1800" b="1">
+                        <a:solidFill>
+                          <a:schemeClr val="tx1"/>
+                        </a:solidFill>
+                        <a:latin typeface="Consolas" panose="020B0609020204030204" charset="0"/>
+                        <a:cs typeface="Consolas" panose="020B0609020204030204" charset="0"/>
+                        <a:sym typeface="+mn-ea"/>
+                      </a:endParaRPr>
+                    </a:p>
+                    <a:p>
+                      <a:pPr>
+                        <a:buNone/>
+                      </a:pPr>
+                      <a:endParaRPr sz="1800" b="1">
+                        <a:solidFill>
+                          <a:schemeClr val="tx1"/>
+                        </a:solidFill>
+                        <a:latin typeface="Consolas" panose="020B0609020204030204" charset="0"/>
+                        <a:cs typeface="Consolas" panose="020B0609020204030204" charset="0"/>
+                        <a:sym typeface="+mn-ea"/>
+                      </a:endParaRPr>
+                    </a:p>
+                    <a:p>
+                      <a:pPr>
+                        <a:buNone/>
+                      </a:pPr>
+                      <a:r>
+                        <a:rPr sz="1800" b="0">
+                          <a:solidFill>
+                            <a:schemeClr val="tx1"/>
+                          </a:solidFill>
+                          <a:latin typeface="Consolas" panose="020B0609020204030204" charset="0"/>
+                          <a:cs typeface="Consolas" panose="020B0609020204030204" charset="0"/>
+                          <a:sym typeface="+mn-ea"/>
+                        </a:rPr>
+                        <a:t>Enter point 1: -5 -7</a:t>
+                      </a:r>
+                      <a:endParaRPr sz="1800" b="0">
+                        <a:solidFill>
+                          <a:schemeClr val="tx1"/>
+                        </a:solidFill>
+                        <a:latin typeface="Consolas" panose="020B0609020204030204" charset="0"/>
+                        <a:cs typeface="Consolas" panose="020B0609020204030204" charset="0"/>
+                        <a:sym typeface="+mn-ea"/>
+                      </a:endParaRPr>
+                    </a:p>
+                    <a:p>
+                      <a:pPr>
+                        <a:buNone/>
+                      </a:pPr>
+                      <a:r>
+                        <a:rPr sz="1800" b="0">
+                          <a:solidFill>
+                            <a:schemeClr val="tx1"/>
+                          </a:solidFill>
+                          <a:latin typeface="Consolas" panose="020B0609020204030204" charset="0"/>
+                          <a:cs typeface="Consolas" panose="020B0609020204030204" charset="0"/>
+                          <a:sym typeface="+mn-ea"/>
+                        </a:rPr>
+                        <a:t>Enter point 2: 1 -8</a:t>
+                      </a:r>
+                      <a:endParaRPr sz="1800" b="0">
+                        <a:solidFill>
+                          <a:schemeClr val="tx1"/>
+                        </a:solidFill>
+                        <a:latin typeface="Consolas" panose="020B0609020204030204" charset="0"/>
+                        <a:cs typeface="Consolas" panose="020B0609020204030204" charset="0"/>
+                        <a:sym typeface="+mn-ea"/>
+                      </a:endParaRPr>
+                    </a:p>
+                    <a:p>
+                      <a:pPr>
+                        <a:buNone/>
+                      </a:pPr>
+                      <a:r>
+                        <a:rPr sz="1800" b="0">
+                          <a:solidFill>
+                            <a:schemeClr val="tx1"/>
+                          </a:solidFill>
+                          <a:latin typeface="Consolas" panose="020B0609020204030204" charset="0"/>
+                          <a:cs typeface="Consolas" panose="020B0609020204030204" charset="0"/>
+                          <a:sym typeface="+mn-ea"/>
+                        </a:rPr>
+                        <a:t>Distance = 6.08</a:t>
+                      </a:r>
+                      <a:endParaRPr sz="1800" b="0">
+                        <a:solidFill>
+                          <a:schemeClr val="tx1"/>
+                        </a:solidFill>
+                        <a:latin typeface="Consolas" panose="020B0609020204030204" charset="0"/>
+                        <a:cs typeface="Consolas" panose="020B0609020204030204" charset="0"/>
+                        <a:sym typeface="+mn-ea"/>
+                      </a:endParaRPr>
+                    </a:p>
+                  </a:txBody>
+                  <a:tcPr>
+                    <a:solidFill>
+                      <a:schemeClr val="accent6">
+                        <a:lumMod val="20000"/>
+                        <a:lumOff val="80000"/>
+                      </a:schemeClr>
+                    </a:solidFill>
+                  </a:tcPr>
+                </a:tc>
+              </a:tr>
+            </a:tbl>
+          </a:graphicData>
+        </a:graphic>
+      </p:graphicFrame>
+    </p:spTree>
+    <p:custDataLst>
+      <p:tags r:id="rId8"/>
     </p:custDataLst>
   </p:cSld>
   <p:clrMapOvr>
@@ -35459,8 +38094,49 @@
 
 <file path=ppt/tags/tag308.xml><?xml version="1.0" encoding="utf-8"?>
 <p:tagLst xmlns:p="http://schemas.openxmlformats.org/presentationml/2006/main">
-  <p:tag name="COMMONDATA" val="eyJoZGlkIjoiZWVjNTQyYWQ1MGI1NzQwNTgzMjZhMzNhMzAyOTZlNDIifQ=="/>
-  <p:tag name="KSO_WPP_MARK_KEY" val="5141afc2-ce81-452e-9c44-a2db9f36b55d"/>
+  <p:tag name="KSO_WM_UNIT_ISCONTENTSTITLE" val="0"/>
+  <p:tag name="KSO_WM_UNIT_PRESET_TEXT" val="单击此处添加标题"/>
+  <p:tag name="KSO_WM_UNIT_NOCLEAR" val="0"/>
+  <p:tag name="KSO_WM_UNIT_VALUE" val="9"/>
+  <p:tag name="KSO_WM_UNIT_HIGHLIGHT" val="0"/>
+  <p:tag name="KSO_WM_UNIT_COMPATIBLE" val="0"/>
+  <p:tag name="KSO_WM_UNIT_DIAGRAM_ISNUMVISUAL" val="0"/>
+  <p:tag name="KSO_WM_UNIT_DIAGRAM_ISREFERUNIT" val="0"/>
+  <p:tag name="KSO_WM_UNIT_TYPE" val="a"/>
+  <p:tag name="KSO_WM_UNIT_INDEX" val="1"/>
+  <p:tag name="KSO_WM_UNIT_ID" val="custom20202582_7*a*1"/>
+  <p:tag name="KSO_WM_TEMPLATE_CATEGORY" val="custom"/>
+  <p:tag name="KSO_WM_TEMPLATE_INDEX" val="20202582"/>
+  <p:tag name="KSO_WM_UNIT_LAYERLEVEL" val="1"/>
+  <p:tag name="KSO_WM_TAG_VERSION" val="1.0"/>
+  <p:tag name="KSO_WM_BEAUTIFY_FLAG" val="#wm#"/>
+  <p:tag name="KSO_WM_UNIT_ISNUMDGMTITLE" val="0"/>
+</p:tagLst>
+</file>
+
+<file path=ppt/tags/tag309.xml><?xml version="1.0" encoding="utf-8"?>
+<p:tagLst xmlns:p="http://schemas.openxmlformats.org/presentationml/2006/main">
+  <p:tag name="KSO_WM_UNIT_ISCONTENTSTITLE" val="0"/>
+  <p:tag name="KSO_WM_UNIT_PRESET_TEXT" val="Contents"/>
+  <p:tag name="KSO_WM_UNIT_NOCLEAR" val="0"/>
+  <p:tag name="KSO_WM_UNIT_VALUE" val="7"/>
+  <p:tag name="KSO_WM_UNIT_HIGHLIGHT" val="0"/>
+  <p:tag name="KSO_WM_UNIT_COMPATIBLE" val="0"/>
+  <p:tag name="KSO_WM_UNIT_DIAGRAM_ISNUMVISUAL" val="0"/>
+  <p:tag name="KSO_WM_UNIT_DIAGRAM_ISREFERUNIT" val="0"/>
+  <p:tag name="KSO_WM_DIAGRAM_GROUP_CODE" val="l1-1"/>
+  <p:tag name="KSO_WM_UNIT_TYPE" val="b"/>
+  <p:tag name="KSO_WM_UNIT_INDEX" val="1"/>
+  <p:tag name="KSO_WM_UNIT_ID" val="custom20202582_3*b*1"/>
+  <p:tag name="KSO_WM_TEMPLATE_CATEGORY" val="custom"/>
+  <p:tag name="KSO_WM_TEMPLATE_INDEX" val="20202582"/>
+  <p:tag name="KSO_WM_UNIT_LAYERLEVEL" val="1"/>
+  <p:tag name="KSO_WM_TAG_VERSION" val="1.0"/>
+  <p:tag name="KSO_WM_BEAUTIFY_FLAG" val="#wm#"/>
+  <p:tag name="KSO_WM_UNIT_ISNUMDGMTITLE" val="0"/>
+  <p:tag name="KSO_WM_UNIT_TEXT_FILL_FORE_SCHEMECOLOR_INDEX" val="13"/>
+  <p:tag name="KSO_WM_UNIT_TEXT_FILL_TYPE" val="1"/>
+  <p:tag name="KSO_WM_UNIT_USESOURCEFORMAT_APPLY" val="1"/>
 </p:tagLst>
 </file>
 
@@ -35474,6 +38150,174 @@
   <p:tag name="KSO_WM_UNIT_LAYERLEVEL" val="1"/>
   <p:tag name="KSO_WM_TAG_VERSION" val="1.0"/>
   <p:tag name="KSO_WM_BEAUTIFY_FLAG" val="#wm#"/>
+</p:tagLst>
+</file>
+
+<file path=ppt/tags/tag310.xml><?xml version="1.0" encoding="utf-8"?>
+<p:tagLst xmlns:p="http://schemas.openxmlformats.org/presentationml/2006/main">
+  <p:tag name="KSO_WM_SLIDE_ID" val="custom20202582_7"/>
+  <p:tag name="KSO_WM_TEMPLATE_SUBCATEGORY" val="0"/>
+  <p:tag name="KSO_WM_TEMPLATE_MASTER_TYPE" val="1"/>
+  <p:tag name="KSO_WM_TEMPLATE_COLOR_TYPE" val="1"/>
+  <p:tag name="KSO_WM_SLIDE_TYPE" val="sectionTitle"/>
+  <p:tag name="KSO_WM_SLIDE_SUBTYPE" val="pureTxt"/>
+  <p:tag name="KSO_WM_SLIDE_ITEM_CNT" val="0"/>
+  <p:tag name="KSO_WM_SLIDE_INDEX" val="7"/>
+  <p:tag name="KSO_WM_TAG_VERSION" val="1.0"/>
+  <p:tag name="KSO_WM_BEAUTIFY_FLAG" val="#wm#"/>
+  <p:tag name="KSO_WM_TEMPLATE_CATEGORY" val="custom"/>
+  <p:tag name="KSO_WM_TEMPLATE_INDEX" val="20202582"/>
+  <p:tag name="KSO_WM_SLIDE_LAYOUT" val="a_b_e_j"/>
+  <p:tag name="KSO_WM_SLIDE_LAYOUT_CNT" val="1_1_1_1"/>
+</p:tagLst>
+</file>
+
+<file path=ppt/tags/tag311.xml><?xml version="1.0" encoding="utf-8"?>
+<p:tagLst xmlns:p="http://schemas.openxmlformats.org/presentationml/2006/main">
+  <p:tag name="KSO_WM_UNIT_ISCONTENTSTITLE" val="0"/>
+  <p:tag name="KSO_WM_UNIT_PRESET_TEXT" val="单击此处添加标题"/>
+  <p:tag name="KSO_WM_UNIT_NOCLEAR" val="0"/>
+  <p:tag name="KSO_WM_UNIT_VALUE" val="42"/>
+  <p:tag name="KSO_WM_UNIT_HIGHLIGHT" val="0"/>
+  <p:tag name="KSO_WM_UNIT_COMPATIBLE" val="0"/>
+  <p:tag name="KSO_WM_UNIT_DIAGRAM_ISNUMVISUAL" val="0"/>
+  <p:tag name="KSO_WM_UNIT_DIAGRAM_ISREFERUNIT" val="0"/>
+  <p:tag name="KSO_WM_UNIT_TYPE" val="a"/>
+  <p:tag name="KSO_WM_UNIT_INDEX" val="1"/>
+  <p:tag name="KSO_WM_UNIT_ID" val="custom20202582_13*a*1"/>
+  <p:tag name="KSO_WM_TEMPLATE_CATEGORY" val="custom"/>
+  <p:tag name="KSO_WM_TEMPLATE_INDEX" val="20202582"/>
+  <p:tag name="KSO_WM_UNIT_LAYERLEVEL" val="1"/>
+  <p:tag name="KSO_WM_TAG_VERSION" val="1.0"/>
+  <p:tag name="KSO_WM_BEAUTIFY_FLAG" val="#wm#"/>
+  <p:tag name="KSO_WM_UNIT_ISNUMDGMTITLE" val="0"/>
+</p:tagLst>
+</file>
+
+<file path=ppt/tags/tag312.xml><?xml version="1.0" encoding="utf-8"?>
+<p:tagLst xmlns:p="http://schemas.openxmlformats.org/presentationml/2006/main">
+  <p:tag name="KSO_WM_UNIT_PRESET_TEXT" val="单击此处添加文本具体内容，简明扼要的阐述您的观点。"/>
+  <p:tag name="KSO_WM_UNIT_NOCLEAR" val="0"/>
+  <p:tag name="KSO_WM_UNIT_VALUE" val="50"/>
+  <p:tag name="KSO_WM_UNIT_HIGHLIGHT" val="0"/>
+  <p:tag name="KSO_WM_UNIT_COMPATIBLE" val="0"/>
+  <p:tag name="KSO_WM_UNIT_DIAGRAM_ISNUMVISUAL" val="0"/>
+  <p:tag name="KSO_WM_UNIT_DIAGRAM_ISREFERUNIT" val="0"/>
+  <p:tag name="KSO_WM_UNIT_TYPE" val="f"/>
+  <p:tag name="KSO_WM_UNIT_INDEX" val="2"/>
+  <p:tag name="KSO_WM_UNIT_ID" val="custom20202582_13*f*2"/>
+  <p:tag name="KSO_WM_TEMPLATE_CATEGORY" val="custom"/>
+  <p:tag name="KSO_WM_TEMPLATE_INDEX" val="20202582"/>
+  <p:tag name="KSO_WM_UNIT_LAYERLEVEL" val="1"/>
+  <p:tag name="KSO_WM_TAG_VERSION" val="1.0"/>
+  <p:tag name="KSO_WM_BEAUTIFY_FLAG" val="#wm#"/>
+  <p:tag name="KSO_WM_UNIT_SUBTYPE" val="a"/>
+</p:tagLst>
+</file>
+
+<file path=ppt/tags/tag313.xml><?xml version="1.0" encoding="utf-8"?>
+<p:tagLst xmlns:p="http://schemas.openxmlformats.org/presentationml/2006/main">
+  <p:tag name="KSO_WM_UNIT_PRESET_TEXT" val="单击此处添加文本具体内容，简明扼要的阐述您的观点。"/>
+  <p:tag name="KSO_WM_UNIT_NOCLEAR" val="0"/>
+  <p:tag name="KSO_WM_UNIT_VALUE" val="50"/>
+  <p:tag name="KSO_WM_UNIT_HIGHLIGHT" val="0"/>
+  <p:tag name="KSO_WM_UNIT_COMPATIBLE" val="0"/>
+  <p:tag name="KSO_WM_UNIT_DIAGRAM_ISNUMVISUAL" val="0"/>
+  <p:tag name="KSO_WM_UNIT_DIAGRAM_ISREFERUNIT" val="0"/>
+  <p:tag name="KSO_WM_UNIT_TYPE" val="f"/>
+  <p:tag name="KSO_WM_UNIT_INDEX" val="2"/>
+  <p:tag name="KSO_WM_UNIT_ID" val="custom20202582_13*f*2"/>
+  <p:tag name="KSO_WM_TEMPLATE_CATEGORY" val="custom"/>
+  <p:tag name="KSO_WM_TEMPLATE_INDEX" val="20202582"/>
+  <p:tag name="KSO_WM_UNIT_LAYERLEVEL" val="1"/>
+  <p:tag name="KSO_WM_TAG_VERSION" val="1.0"/>
+  <p:tag name="KSO_WM_BEAUTIFY_FLAG" val="#wm#"/>
+  <p:tag name="KSO_WM_UNIT_SUBTYPE" val="a"/>
+</p:tagLst>
+</file>
+
+<file path=ppt/tags/tag314.xml><?xml version="1.0" encoding="utf-8"?>
+<p:tagLst xmlns:p="http://schemas.openxmlformats.org/presentationml/2006/main">
+  <p:tag name="TABLE_ENDDRAG_ORIGIN_RECT" val="351*115"/>
+  <p:tag name="TABLE_ENDDRAG_RECT" val="526*259*351*115"/>
+</p:tagLst>
+</file>
+
+<file path=ppt/tags/tag315.xml><?xml version="1.0" encoding="utf-8"?>
+<p:tagLst xmlns:p="http://schemas.openxmlformats.org/presentationml/2006/main">
+  <p:tag name="TABLE_ENDDRAG_ORIGIN_RECT" val="338*99"/>
+  <p:tag name="TABLE_ENDDRAG_RECT" val="538*118*338*99"/>
+</p:tagLst>
+</file>
+
+<file path=ppt/tags/tag316.xml><?xml version="1.0" encoding="utf-8"?>
+<p:tagLst xmlns:p="http://schemas.openxmlformats.org/presentationml/2006/main">
+  <p:tag name="KSO_WM_SLIDE_ID" val="custom20202582_13"/>
+  <p:tag name="KSO_WM_TEMPLATE_SUBCATEGORY" val="0"/>
+  <p:tag name="KSO_WM_TEMPLATE_MASTER_TYPE" val="1"/>
+  <p:tag name="KSO_WM_TEMPLATE_COLOR_TYPE" val="1"/>
+  <p:tag name="KSO_WM_SLIDE_TYPE" val="text"/>
+  <p:tag name="KSO_WM_SLIDE_SUBTYPE" val="picTxt"/>
+  <p:tag name="KSO_WM_SLIDE_ITEM_CNT" val="0"/>
+  <p:tag name="KSO_WM_SLIDE_INDEX" val="13"/>
+  <p:tag name="KSO_WM_SLIDE_SIZE" val="869*422"/>
+  <p:tag name="KSO_WM_SLIDE_POSITION" val="45*18"/>
+  <p:tag name="KSO_WM_TAG_VERSION" val="1.0"/>
+  <p:tag name="KSO_WM_BEAUTIFY_FLAG" val="#wm#"/>
+  <p:tag name="KSO_WM_TEMPLATE_CATEGORY" val="custom"/>
+  <p:tag name="KSO_WM_TEMPLATE_INDEX" val="20202582"/>
+  <p:tag name="KSO_WM_SLIDE_LAYOUT" val="a_d_f"/>
+  <p:tag name="KSO_WM_SLIDE_LAYOUT_CNT" val="1_2_2"/>
+</p:tagLst>
+</file>
+
+<file path=ppt/tags/tag317.xml><?xml version="1.0" encoding="utf-8"?>
+<p:tagLst xmlns:p="http://schemas.openxmlformats.org/presentationml/2006/main">
+  <p:tag name="KSO_WM_UNIT_ISCONTENTSTITLE" val="0"/>
+  <p:tag name="KSO_WM_UNIT_PRESET_TEXT" val="单击此处添加标题"/>
+  <p:tag name="KSO_WM_UNIT_NOCLEAR" val="0"/>
+  <p:tag name="KSO_WM_UNIT_VALUE" val="42"/>
+  <p:tag name="KSO_WM_UNIT_HIGHLIGHT" val="0"/>
+  <p:tag name="KSO_WM_UNIT_COMPATIBLE" val="0"/>
+  <p:tag name="KSO_WM_UNIT_DIAGRAM_ISNUMVISUAL" val="0"/>
+  <p:tag name="KSO_WM_UNIT_DIAGRAM_ISREFERUNIT" val="0"/>
+  <p:tag name="KSO_WM_UNIT_TYPE" val="a"/>
+  <p:tag name="KSO_WM_UNIT_INDEX" val="1"/>
+  <p:tag name="KSO_WM_UNIT_ID" val="custom20202582_13*a*1"/>
+  <p:tag name="KSO_WM_TEMPLATE_CATEGORY" val="custom"/>
+  <p:tag name="KSO_WM_TEMPLATE_INDEX" val="20202582"/>
+  <p:tag name="KSO_WM_UNIT_LAYERLEVEL" val="1"/>
+  <p:tag name="KSO_WM_TAG_VERSION" val="1.0"/>
+  <p:tag name="KSO_WM_BEAUTIFY_FLAG" val="#wm#"/>
+  <p:tag name="KSO_WM_UNIT_ISNUMDGMTITLE" val="0"/>
+</p:tagLst>
+</file>
+
+<file path=ppt/tags/tag318.xml><?xml version="1.0" encoding="utf-8"?>
+<p:tagLst xmlns:p="http://schemas.openxmlformats.org/presentationml/2006/main">
+  <p:tag name="TABLE_ENDDRAG_ORIGIN_RECT" val="520*115"/>
+  <p:tag name="TABLE_ENDDRAG_RECT" val="227*391*520*115"/>
+</p:tagLst>
+</file>
+
+<file path=ppt/tags/tag319.xml><?xml version="1.0" encoding="utf-8"?>
+<p:tagLst xmlns:p="http://schemas.openxmlformats.org/presentationml/2006/main">
+  <p:tag name="KSO_WM_UNIT_PRESET_TEXT" val="单击此处添加文本具体内容，简明扼要的阐述您的观点。"/>
+  <p:tag name="KSO_WM_UNIT_NOCLEAR" val="0"/>
+  <p:tag name="KSO_WM_UNIT_VALUE" val="50"/>
+  <p:tag name="KSO_WM_UNIT_HIGHLIGHT" val="0"/>
+  <p:tag name="KSO_WM_UNIT_COMPATIBLE" val="0"/>
+  <p:tag name="KSO_WM_UNIT_DIAGRAM_ISNUMVISUAL" val="0"/>
+  <p:tag name="KSO_WM_UNIT_DIAGRAM_ISREFERUNIT" val="0"/>
+  <p:tag name="KSO_WM_UNIT_TYPE" val="f"/>
+  <p:tag name="KSO_WM_UNIT_INDEX" val="2"/>
+  <p:tag name="KSO_WM_UNIT_ID" val="custom20202582_13*f*2"/>
+  <p:tag name="KSO_WM_TEMPLATE_CATEGORY" val="custom"/>
+  <p:tag name="KSO_WM_TEMPLATE_INDEX" val="20202582"/>
+  <p:tag name="KSO_WM_UNIT_LAYERLEVEL" val="1"/>
+  <p:tag name="KSO_WM_TAG_VERSION" val="1.0"/>
+  <p:tag name="KSO_WM_BEAUTIFY_FLAG" val="#wm#"/>
+  <p:tag name="KSO_WM_UNIT_SUBTYPE" val="a"/>
 </p:tagLst>
 </file>
 
@@ -35495,6 +38339,147 @@
 </p:tagLst>
 </file>
 
+<file path=ppt/tags/tag320.xml><?xml version="1.0" encoding="utf-8"?>
+<p:tagLst xmlns:p="http://schemas.openxmlformats.org/presentationml/2006/main">
+  <p:tag name="TABLE_ENDDRAG_ORIGIN_RECT" val="504*115"/>
+  <p:tag name="TABLE_ENDDRAG_RECT" val="425*113*504*115"/>
+</p:tagLst>
+</file>
+
+<file path=ppt/tags/tag321.xml><?xml version="1.0" encoding="utf-8"?>
+<p:tagLst xmlns:p="http://schemas.openxmlformats.org/presentationml/2006/main">
+  <p:tag name="TABLE_ENDDRAG_ORIGIN_RECT" val="504*115"/>
+  <p:tag name="TABLE_ENDDRAG_RECT" val="425*113*504*115"/>
+</p:tagLst>
+</file>
+
+<file path=ppt/tags/tag322.xml><?xml version="1.0" encoding="utf-8"?>
+<p:tagLst xmlns:p="http://schemas.openxmlformats.org/presentationml/2006/main">
+  <p:tag name="KSO_WM_SLIDE_ID" val="custom20202582_13"/>
+  <p:tag name="KSO_WM_TEMPLATE_SUBCATEGORY" val="0"/>
+  <p:tag name="KSO_WM_TEMPLATE_MASTER_TYPE" val="1"/>
+  <p:tag name="KSO_WM_TEMPLATE_COLOR_TYPE" val="1"/>
+  <p:tag name="KSO_WM_SLIDE_TYPE" val="text"/>
+  <p:tag name="KSO_WM_SLIDE_SUBTYPE" val="picTxt"/>
+  <p:tag name="KSO_WM_SLIDE_ITEM_CNT" val="0"/>
+  <p:tag name="KSO_WM_SLIDE_INDEX" val="13"/>
+  <p:tag name="KSO_WM_SLIDE_SIZE" val="869*422"/>
+  <p:tag name="KSO_WM_SLIDE_POSITION" val="45*18"/>
+  <p:tag name="KSO_WM_TAG_VERSION" val="1.0"/>
+  <p:tag name="KSO_WM_BEAUTIFY_FLAG" val="#wm#"/>
+  <p:tag name="KSO_WM_TEMPLATE_CATEGORY" val="custom"/>
+  <p:tag name="KSO_WM_TEMPLATE_INDEX" val="20202582"/>
+  <p:tag name="KSO_WM_SLIDE_LAYOUT" val="a_d_f"/>
+  <p:tag name="KSO_WM_SLIDE_LAYOUT_CNT" val="1_2_2"/>
+</p:tagLst>
+</file>
+
+<file path=ppt/tags/tag323.xml><?xml version="1.0" encoding="utf-8"?>
+<p:tagLst xmlns:p="http://schemas.openxmlformats.org/presentationml/2006/main">
+  <p:tag name="KSO_WM_UNIT_ISCONTENTSTITLE" val="0"/>
+  <p:tag name="KSO_WM_UNIT_PRESET_TEXT" val="单击此处添加标题"/>
+  <p:tag name="KSO_WM_UNIT_NOCLEAR" val="0"/>
+  <p:tag name="KSO_WM_UNIT_VALUE" val="42"/>
+  <p:tag name="KSO_WM_UNIT_HIGHLIGHT" val="0"/>
+  <p:tag name="KSO_WM_UNIT_COMPATIBLE" val="0"/>
+  <p:tag name="KSO_WM_UNIT_DIAGRAM_ISNUMVISUAL" val="0"/>
+  <p:tag name="KSO_WM_UNIT_DIAGRAM_ISREFERUNIT" val="0"/>
+  <p:tag name="KSO_WM_UNIT_TYPE" val="a"/>
+  <p:tag name="KSO_WM_UNIT_INDEX" val="1"/>
+  <p:tag name="KSO_WM_UNIT_ID" val="custom20202582_13*a*1"/>
+  <p:tag name="KSO_WM_TEMPLATE_CATEGORY" val="custom"/>
+  <p:tag name="KSO_WM_TEMPLATE_INDEX" val="20202582"/>
+  <p:tag name="KSO_WM_UNIT_LAYERLEVEL" val="1"/>
+  <p:tag name="KSO_WM_TAG_VERSION" val="1.0"/>
+  <p:tag name="KSO_WM_BEAUTIFY_FLAG" val="#wm#"/>
+  <p:tag name="KSO_WM_UNIT_ISNUMDGMTITLE" val="0"/>
+</p:tagLst>
+</file>
+
+<file path=ppt/tags/tag324.xml><?xml version="1.0" encoding="utf-8"?>
+<p:tagLst xmlns:p="http://schemas.openxmlformats.org/presentationml/2006/main">
+  <p:tag name="TABLE_ENDDRAG_ORIGIN_RECT" val="239*115"/>
+  <p:tag name="TABLE_ENDDRAG_RECT" val="194*375*239*115"/>
+</p:tagLst>
+</file>
+
+<file path=ppt/tags/tag325.xml><?xml version="1.0" encoding="utf-8"?>
+<p:tagLst xmlns:p="http://schemas.openxmlformats.org/presentationml/2006/main">
+  <p:tag name="KSO_WM_UNIT_PRESET_TEXT" val="单击此处添加文本具体内容，简明扼要的阐述您的观点。"/>
+  <p:tag name="KSO_WM_UNIT_NOCLEAR" val="0"/>
+  <p:tag name="KSO_WM_UNIT_VALUE" val="50"/>
+  <p:tag name="KSO_WM_UNIT_HIGHLIGHT" val="0"/>
+  <p:tag name="KSO_WM_UNIT_COMPATIBLE" val="0"/>
+  <p:tag name="KSO_WM_UNIT_DIAGRAM_ISNUMVISUAL" val="0"/>
+  <p:tag name="KSO_WM_UNIT_DIAGRAM_ISREFERUNIT" val="0"/>
+  <p:tag name="KSO_WM_UNIT_TYPE" val="f"/>
+  <p:tag name="KSO_WM_UNIT_INDEX" val="2"/>
+  <p:tag name="KSO_WM_UNIT_ID" val="custom20202582_13*f*2"/>
+  <p:tag name="KSO_WM_TEMPLATE_CATEGORY" val="custom"/>
+  <p:tag name="KSO_WM_TEMPLATE_INDEX" val="20202582"/>
+  <p:tag name="KSO_WM_UNIT_LAYERLEVEL" val="1"/>
+  <p:tag name="KSO_WM_TAG_VERSION" val="1.0"/>
+  <p:tag name="KSO_WM_BEAUTIFY_FLAG" val="#wm#"/>
+  <p:tag name="KSO_WM_UNIT_SUBTYPE" val="a"/>
+</p:tagLst>
+</file>
+
+<file path=ppt/tags/tag326.xml><?xml version="1.0" encoding="utf-8"?>
+<p:tagLst xmlns:p="http://schemas.openxmlformats.org/presentationml/2006/main">
+  <p:tag name="KSO_WM_UNIT_PRESET_TEXT" val="单击此处添加文本具体内容，简明扼要的阐述您的观点。"/>
+  <p:tag name="KSO_WM_UNIT_NOCLEAR" val="0"/>
+  <p:tag name="KSO_WM_UNIT_VALUE" val="50"/>
+  <p:tag name="KSO_WM_UNIT_HIGHLIGHT" val="0"/>
+  <p:tag name="KSO_WM_UNIT_COMPATIBLE" val="0"/>
+  <p:tag name="KSO_WM_UNIT_DIAGRAM_ISNUMVISUAL" val="0"/>
+  <p:tag name="KSO_WM_UNIT_DIAGRAM_ISREFERUNIT" val="0"/>
+  <p:tag name="KSO_WM_UNIT_TYPE" val="f"/>
+  <p:tag name="KSO_WM_UNIT_INDEX" val="2"/>
+  <p:tag name="KSO_WM_UNIT_ID" val="custom20202582_13*f*2"/>
+  <p:tag name="KSO_WM_TEMPLATE_CATEGORY" val="custom"/>
+  <p:tag name="KSO_WM_TEMPLATE_INDEX" val="20202582"/>
+  <p:tag name="KSO_WM_UNIT_LAYERLEVEL" val="1"/>
+  <p:tag name="KSO_WM_TAG_VERSION" val="1.0"/>
+  <p:tag name="KSO_WM_BEAUTIFY_FLAG" val="#wm#"/>
+  <p:tag name="KSO_WM_UNIT_SUBTYPE" val="a"/>
+</p:tagLst>
+</file>
+
+<file path=ppt/tags/tag327.xml><?xml version="1.0" encoding="utf-8"?>
+<p:tagLst xmlns:p="http://schemas.openxmlformats.org/presentationml/2006/main">
+  <p:tag name="TABLE_ENDDRAG_ORIGIN_RECT" val="239*115"/>
+  <p:tag name="TABLE_ENDDRAG_RECT" val="194*375*239*115"/>
+</p:tagLst>
+</file>
+
+<file path=ppt/tags/tag328.xml><?xml version="1.0" encoding="utf-8"?>
+<p:tagLst xmlns:p="http://schemas.openxmlformats.org/presentationml/2006/main">
+  <p:tag name="TABLE_ENDDRAG_ORIGIN_RECT" val="239*115"/>
+  <p:tag name="TABLE_ENDDRAG_RECT" val="194*375*239*115"/>
+</p:tagLst>
+</file>
+
+<file path=ppt/tags/tag329.xml><?xml version="1.0" encoding="utf-8"?>
+<p:tagLst xmlns:p="http://schemas.openxmlformats.org/presentationml/2006/main">
+  <p:tag name="KSO_WM_SLIDE_ID" val="custom20202582_13"/>
+  <p:tag name="KSO_WM_TEMPLATE_SUBCATEGORY" val="0"/>
+  <p:tag name="KSO_WM_TEMPLATE_MASTER_TYPE" val="1"/>
+  <p:tag name="KSO_WM_TEMPLATE_COLOR_TYPE" val="1"/>
+  <p:tag name="KSO_WM_SLIDE_TYPE" val="text"/>
+  <p:tag name="KSO_WM_SLIDE_SUBTYPE" val="picTxt"/>
+  <p:tag name="KSO_WM_SLIDE_ITEM_CNT" val="0"/>
+  <p:tag name="KSO_WM_SLIDE_INDEX" val="13"/>
+  <p:tag name="KSO_WM_SLIDE_SIZE" val="869*422"/>
+  <p:tag name="KSO_WM_SLIDE_POSITION" val="45*18"/>
+  <p:tag name="KSO_WM_TAG_VERSION" val="1.0"/>
+  <p:tag name="KSO_WM_BEAUTIFY_FLAG" val="#wm#"/>
+  <p:tag name="KSO_WM_TEMPLATE_CATEGORY" val="custom"/>
+  <p:tag name="KSO_WM_TEMPLATE_INDEX" val="20202582"/>
+  <p:tag name="KSO_WM_SLIDE_LAYOUT" val="a_d_f"/>
+  <p:tag name="KSO_WM_SLIDE_LAYOUT_CNT" val="1_2_2"/>
+</p:tagLst>
+</file>
+
 <file path=ppt/tags/tag33.xml><?xml version="1.0" encoding="utf-8"?>
 <p:tagLst xmlns:p="http://schemas.openxmlformats.org/presentationml/2006/main">
   <p:tag name="KSO_WM_UNIT_HIGHLIGHT" val="0"/>
@@ -35505,6 +38490,13 @@
   <p:tag name="KSO_WM_UNIT_LAYERLEVEL" val="1"/>
   <p:tag name="KSO_WM_TAG_VERSION" val="1.0"/>
   <p:tag name="KSO_WM_BEAUTIFY_FLAG" val="#wm#"/>
+</p:tagLst>
+</file>
+
+<file path=ppt/tags/tag330.xml><?xml version="1.0" encoding="utf-8"?>
+<p:tagLst xmlns:p="http://schemas.openxmlformats.org/presentationml/2006/main">
+  <p:tag name="COMMONDATA" val="eyJoZGlkIjoiZWVjNTQyYWQ1MGI1NzQwNTgzMjZhMzNhMzAyOTZlNDIifQ=="/>
+  <p:tag name="KSO_WPP_MARK_KEY" val="5141afc2-ce81-452e-9c44-a2db9f36b55d"/>
 </p:tagLst>
 </file>
 

</xml_diff>